<commit_message>
Ajout de mesures de l'outil Wave
</commit_message>
<xml_diff>
--- a/audit/Présentation du projet 4.pptx
+++ b/audit/Présentation du projet 4.pptx
@@ -8,20 +8,22 @@
     <p:sldId id="256" r:id="rId2"/>
     <p:sldId id="257" r:id="rId3"/>
     <p:sldId id="258" r:id="rId4"/>
-    <p:sldId id="259" r:id="rId5"/>
-    <p:sldId id="260" r:id="rId6"/>
-    <p:sldId id="261" r:id="rId7"/>
-    <p:sldId id="262" r:id="rId8"/>
-    <p:sldId id="263" r:id="rId9"/>
-    <p:sldId id="264" r:id="rId10"/>
-    <p:sldId id="265" r:id="rId11"/>
-    <p:sldId id="266" r:id="rId12"/>
-    <p:sldId id="267" r:id="rId13"/>
-    <p:sldId id="268" r:id="rId14"/>
-    <p:sldId id="269" r:id="rId15"/>
-    <p:sldId id="270" r:id="rId16"/>
-    <p:sldId id="271" r:id="rId17"/>
-    <p:sldId id="272" r:id="rId18"/>
+    <p:sldId id="273" r:id="rId5"/>
+    <p:sldId id="274" r:id="rId6"/>
+    <p:sldId id="259" r:id="rId7"/>
+    <p:sldId id="260" r:id="rId8"/>
+    <p:sldId id="261" r:id="rId9"/>
+    <p:sldId id="262" r:id="rId10"/>
+    <p:sldId id="263" r:id="rId11"/>
+    <p:sldId id="264" r:id="rId12"/>
+    <p:sldId id="265" r:id="rId13"/>
+    <p:sldId id="266" r:id="rId14"/>
+    <p:sldId id="267" r:id="rId15"/>
+    <p:sldId id="268" r:id="rId16"/>
+    <p:sldId id="269" r:id="rId17"/>
+    <p:sldId id="270" r:id="rId18"/>
+    <p:sldId id="271" r:id="rId19"/>
+    <p:sldId id="272" r:id="rId20"/>
   </p:sldIdLst>
   <p:sldSz cx="12192000" cy="6858000"/>
   <p:notesSz cx="6858000" cy="9144000"/>
@@ -3772,7 +3774,7 @@
           <p:cNvPr id="2" name="Titre 1">
             <a:extLst>
               <a:ext uri="{FF2B5EF4-FFF2-40B4-BE49-F238E27FC236}">
-                <a16:creationId xmlns:a16="http://schemas.microsoft.com/office/drawing/2014/main" id="{101ABBF6-8598-4596-9587-67E9A0B69AB7}"/>
+                <a16:creationId xmlns:a16="http://schemas.microsoft.com/office/drawing/2014/main" id="{5F33EB2F-A620-4283-AF37-8284E33BE126}"/>
               </a:ext>
             </a:extLst>
           </p:cNvPr>
@@ -3790,7 +3792,23 @@
           <a:p>
             <a:r>
               <a:rPr lang="fr-FR" dirty="0"/>
-              <a:t>4-name="description" content=""</a:t>
+              <a:t>2-balise &lt;</a:t>
+            </a:r>
+            <a:r>
+              <a:rPr lang="fr-FR" dirty="0" err="1"/>
+              <a:t>title</a:t>
+            </a:r>
+            <a:r>
+              <a:rPr lang="fr-FR" dirty="0"/>
+              <a:t>&gt;&lt;/</a:t>
+            </a:r>
+            <a:r>
+              <a:rPr lang="fr-FR" dirty="0" err="1"/>
+              <a:t>title</a:t>
+            </a:r>
+            <a:r>
+              <a:rPr lang="fr-FR" dirty="0"/>
+              <a:t>&gt;</a:t>
             </a:r>
           </a:p>
         </p:txBody>
@@ -3800,7 +3818,7 @@
           <p:cNvPr id="3" name="Espace réservé du contenu 2">
             <a:extLst>
               <a:ext uri="{FF2B5EF4-FFF2-40B4-BE49-F238E27FC236}">
-                <a16:creationId xmlns:a16="http://schemas.microsoft.com/office/drawing/2014/main" id="{2818D3C8-A90F-4E57-A8FF-9D638B52D22F}"/>
+                <a16:creationId xmlns:a16="http://schemas.microsoft.com/office/drawing/2014/main" id="{490E0A6D-5595-428E-99FF-84C3E85E0E13}"/>
               </a:ext>
             </a:extLst>
           </p:cNvPr>
@@ -3818,7 +3836,7 @@
           <a:p>
             <a:r>
               <a:rPr lang="fr-FR" dirty="0"/>
-              <a:t>La balise description est presque aussi importante que la balise </a:t>
+              <a:t>La balise </a:t>
             </a:r>
             <a:r>
               <a:rPr lang="fr-FR" dirty="0" err="1"/>
@@ -3826,7 +3844,7 @@
             </a:r>
             <a:r>
               <a:rPr lang="fr-FR" dirty="0"/>
-              <a:t>. Les mots clés à l’intérieur aident Google à savoir de quoi parle la page, et c’est aussi ce qui est affiché sous le </a:t>
+              <a:t> est l’une des balises les plus importantes pour Google car elle sert à définir le sujet / but principal de la page. Un point n’est pas explicite. Le </a:t>
             </a:r>
             <a:r>
               <a:rPr lang="fr-FR" dirty="0" err="1"/>
@@ -3834,7 +3852,7 @@
             </a:r>
             <a:r>
               <a:rPr lang="fr-FR" dirty="0"/>
-              <a:t> dans les résultats de recherche, c’est donc aussi utile pour vos visiteurs.</a:t>
+              <a:t> sera d’ailleurs aussi affiché sur les résultats de recherches de Google, il faut donc que les utilisateurs aussi comprennent le but de la page pour cliquer.</a:t>
             </a:r>
           </a:p>
         </p:txBody>
@@ -3842,7 +3860,7 @@
     </p:spTree>
     <p:extLst>
       <p:ext uri="{BB962C8B-B14F-4D97-AF65-F5344CB8AC3E}">
-        <p14:creationId xmlns:p14="http://schemas.microsoft.com/office/powerpoint/2010/main" val="2442860782"/>
+        <p14:creationId xmlns:p14="http://schemas.microsoft.com/office/powerpoint/2010/main" val="1889303693"/>
       </p:ext>
     </p:extLst>
   </p:cSld>
@@ -3874,7 +3892,7 @@
           <p:cNvPr id="2" name="Titre 1">
             <a:extLst>
               <a:ext uri="{FF2B5EF4-FFF2-40B4-BE49-F238E27FC236}">
-                <a16:creationId xmlns:a16="http://schemas.microsoft.com/office/drawing/2014/main" id="{E071402D-725B-4167-84CF-36D5371B96EC}"/>
+                <a16:creationId xmlns:a16="http://schemas.microsoft.com/office/drawing/2014/main" id="{47EA7F8F-07F8-43C0-97E2-E65BFEF9F59F}"/>
               </a:ext>
             </a:extLst>
           </p:cNvPr>
@@ -3892,7 +3910,7 @@
           <a:p>
             <a:r>
               <a:rPr lang="fr-FR" dirty="0"/>
-              <a:t>5-Pas de balises sémantiques</a:t>
+              <a:t>3-Textes sous forme d’image</a:t>
             </a:r>
           </a:p>
         </p:txBody>
@@ -3902,7 +3920,7 @@
           <p:cNvPr id="3" name="Espace réservé du contenu 2">
             <a:extLst>
               <a:ext uri="{FF2B5EF4-FFF2-40B4-BE49-F238E27FC236}">
-                <a16:creationId xmlns:a16="http://schemas.microsoft.com/office/drawing/2014/main" id="{77B67AB7-B559-4099-8262-D9424AF43D58}"/>
+                <a16:creationId xmlns:a16="http://schemas.microsoft.com/office/drawing/2014/main" id="{992E6C39-BF46-4688-9AD8-6F11465FC4E0}"/>
               </a:ext>
             </a:extLst>
           </p:cNvPr>
@@ -3920,7 +3938,7 @@
           <a:p>
             <a:r>
               <a:rPr lang="fr-FR" dirty="0"/>
-              <a:t>Les balises sémantiques permettent une meilleure accessibilité des contenus pour les personnes nécessitant des logiciels de lecture de site pour consulter le web.</a:t>
+              <a:t>Certaines phrases dans la page sont implémentées sous forme d’image. Ca augmente le temps de chargement de la page car les images sont plus lourdes que le texte brut, et ça impacte donc le SEO car le temps de chargement de la page est un critère important pour Google. En plus, les images sont moins pratiques pour adapter le texte sur petits écrans (responsive). De plus, les lecteurs d’écran ne pourront pas lire le texte dans l’image pour les malvoyants. Enfin,  au format texte, on pourra inclure des mots clés pertinents qui ne seront pas reconnus par Google au format image.</a:t>
             </a:r>
           </a:p>
         </p:txBody>
@@ -3928,7 +3946,7 @@
     </p:spTree>
     <p:extLst>
       <p:ext uri="{BB962C8B-B14F-4D97-AF65-F5344CB8AC3E}">
-        <p14:creationId xmlns:p14="http://schemas.microsoft.com/office/powerpoint/2010/main" val="2554116559"/>
+        <p14:creationId xmlns:p14="http://schemas.microsoft.com/office/powerpoint/2010/main" val="434277876"/>
       </p:ext>
     </p:extLst>
   </p:cSld>
@@ -3960,7 +3978,7 @@
           <p:cNvPr id="2" name="Titre 1">
             <a:extLst>
               <a:ext uri="{FF2B5EF4-FFF2-40B4-BE49-F238E27FC236}">
-                <a16:creationId xmlns:a16="http://schemas.microsoft.com/office/drawing/2014/main" id="{F9D44077-2EF9-4EC8-8AC7-5F2BF9EC611F}"/>
+                <a16:creationId xmlns:a16="http://schemas.microsoft.com/office/drawing/2014/main" id="{101ABBF6-8598-4596-9587-67E9A0B69AB7}"/>
               </a:ext>
             </a:extLst>
           </p:cNvPr>
@@ -3978,7 +3996,7 @@
           <a:p>
             <a:r>
               <a:rPr lang="fr-FR" dirty="0"/>
-              <a:t>6-Textes sous forme d’image</a:t>
+              <a:t>4-name="description" content=""</a:t>
             </a:r>
           </a:p>
         </p:txBody>
@@ -3988,7 +4006,7 @@
           <p:cNvPr id="3" name="Espace réservé du contenu 2">
             <a:extLst>
               <a:ext uri="{FF2B5EF4-FFF2-40B4-BE49-F238E27FC236}">
-                <a16:creationId xmlns:a16="http://schemas.microsoft.com/office/drawing/2014/main" id="{351189DE-4427-4C60-896A-8E0351FB23DE}"/>
+                <a16:creationId xmlns:a16="http://schemas.microsoft.com/office/drawing/2014/main" id="{2818D3C8-A90F-4E57-A8FF-9D638B52D22F}"/>
               </a:ext>
             </a:extLst>
           </p:cNvPr>
@@ -4006,7 +4024,23 @@
           <a:p>
             <a:r>
               <a:rPr lang="fr-FR" dirty="0"/>
-              <a:t>Certaines phrases dans la page sont implémentés sous forme d’image. CA augmente le temps de chargement de la page car les images sont plus lourdes que le texte brute, et ça impacte donc le SEO car le temps de chargement de la page est un critère important pour Google. En plus, les images sont moins pratiques pour adapter le texte sur petits écrans (responsive). De plus, les lecteurs d’écran ne pourront pas lire le texte dans l’image pour les malvoyants. Enfin,  au format texte, on pourra inclure des mots clés pertinents qui ne seront pas reconnus par Google au format image.</a:t>
+              <a:t>La balise description est presque aussi importante que la balise </a:t>
+            </a:r>
+            <a:r>
+              <a:rPr lang="fr-FR" dirty="0" err="1"/>
+              <a:t>title</a:t>
+            </a:r>
+            <a:r>
+              <a:rPr lang="fr-FR" dirty="0"/>
+              <a:t>. Les mots clés à l’intérieur aident Google à savoir de quoi parle la page, et c’est aussi ce qui est affiché sous le </a:t>
+            </a:r>
+            <a:r>
+              <a:rPr lang="fr-FR" dirty="0" err="1"/>
+              <a:t>title</a:t>
+            </a:r>
+            <a:r>
+              <a:rPr lang="fr-FR" dirty="0"/>
+              <a:t> dans les résultats de recherche, c’est donc aussi utile pour vos visiteurs.</a:t>
             </a:r>
           </a:p>
         </p:txBody>
@@ -4014,7 +4048,7 @@
     </p:spTree>
     <p:extLst>
       <p:ext uri="{BB962C8B-B14F-4D97-AF65-F5344CB8AC3E}">
-        <p14:creationId xmlns:p14="http://schemas.microsoft.com/office/powerpoint/2010/main" val="1584401365"/>
+        <p14:creationId xmlns:p14="http://schemas.microsoft.com/office/powerpoint/2010/main" val="2442860782"/>
       </p:ext>
     </p:extLst>
   </p:cSld>
@@ -4046,7 +4080,7 @@
           <p:cNvPr id="2" name="Titre 1">
             <a:extLst>
               <a:ext uri="{FF2B5EF4-FFF2-40B4-BE49-F238E27FC236}">
-                <a16:creationId xmlns:a16="http://schemas.microsoft.com/office/drawing/2014/main" id="{5EA6563D-5AAA-4444-AA4B-99CA74C1A647}"/>
+                <a16:creationId xmlns:a16="http://schemas.microsoft.com/office/drawing/2014/main" id="{E071402D-725B-4167-84CF-36D5371B96EC}"/>
               </a:ext>
             </a:extLst>
           </p:cNvPr>
@@ -4064,23 +4098,7 @@
           <a:p>
             <a:r>
               <a:rPr lang="fr-FR" dirty="0"/>
-              <a:t>7-&lt;</a:t>
-            </a:r>
-            <a:r>
-              <a:rPr lang="fr-FR" dirty="0" err="1"/>
-              <a:t>meta</a:t>
-            </a:r>
-            <a:r>
-              <a:rPr lang="fr-FR" dirty="0"/>
-              <a:t> </a:t>
-            </a:r>
-            <a:r>
-              <a:rPr lang="fr-FR" dirty="0" err="1"/>
-              <a:t>name</a:t>
-            </a:r>
-            <a:r>
-              <a:rPr lang="fr-FR" dirty="0"/>
-              <a:t>="keywords" content="[...]"&gt;</a:t>
+              <a:t>5-Pas de balises sémantiques</a:t>
             </a:r>
           </a:p>
         </p:txBody>
@@ -4090,7 +4108,7 @@
           <p:cNvPr id="3" name="Espace réservé du contenu 2">
             <a:extLst>
               <a:ext uri="{FF2B5EF4-FFF2-40B4-BE49-F238E27FC236}">
-                <a16:creationId xmlns:a16="http://schemas.microsoft.com/office/drawing/2014/main" id="{087799E5-AA99-4EB5-8A44-D8E0C1F5AC27}"/>
+                <a16:creationId xmlns:a16="http://schemas.microsoft.com/office/drawing/2014/main" id="{77B67AB7-B559-4099-8262-D9424AF43D58}"/>
               </a:ext>
             </a:extLst>
           </p:cNvPr>
@@ -4108,7 +4126,7 @@
           <a:p>
             <a:r>
               <a:rPr lang="fr-FR" dirty="0"/>
-              <a:t>La balise Keywords est dépréciée aujourd’hui. Au mieux elle n’est pas prise en compte, au pire cela peut-être sanctionné si il y a trop de mots clés dans la balise.</a:t>
+              <a:t>Les balises sémantiques permettent une meilleure accessibilité des contenus pour les personnes nécessitant des logiciels de lecture de site pour consulter le web.</a:t>
             </a:r>
           </a:p>
         </p:txBody>
@@ -4116,7 +4134,7 @@
     </p:spTree>
     <p:extLst>
       <p:ext uri="{BB962C8B-B14F-4D97-AF65-F5344CB8AC3E}">
-        <p14:creationId xmlns:p14="http://schemas.microsoft.com/office/powerpoint/2010/main" val="3584817504"/>
+        <p14:creationId xmlns:p14="http://schemas.microsoft.com/office/powerpoint/2010/main" val="2554116559"/>
       </p:ext>
     </p:extLst>
   </p:cSld>
@@ -4148,7 +4166,7 @@
           <p:cNvPr id="2" name="Titre 1">
             <a:extLst>
               <a:ext uri="{FF2B5EF4-FFF2-40B4-BE49-F238E27FC236}">
-                <a16:creationId xmlns:a16="http://schemas.microsoft.com/office/drawing/2014/main" id="{8BD9F299-88A2-464C-B7BE-0D78EBBAC5A1}"/>
+                <a16:creationId xmlns:a16="http://schemas.microsoft.com/office/drawing/2014/main" id="{F9D44077-2EF9-4EC8-8AC7-5F2BF9EC611F}"/>
               </a:ext>
             </a:extLst>
           </p:cNvPr>
@@ -4166,7 +4184,7 @@
           <a:p>
             <a:r>
               <a:rPr lang="fr-FR" dirty="0"/>
-              <a:t>8-Le nom de la page de contact</a:t>
+              <a:t>6-Textes sous forme d’image</a:t>
             </a:r>
           </a:p>
         </p:txBody>
@@ -4176,7 +4194,7 @@
           <p:cNvPr id="3" name="Espace réservé du contenu 2">
             <a:extLst>
               <a:ext uri="{FF2B5EF4-FFF2-40B4-BE49-F238E27FC236}">
-                <a16:creationId xmlns:a16="http://schemas.microsoft.com/office/drawing/2014/main" id="{ED69E767-A1CB-4D6C-A315-C8D7249555CE}"/>
+                <a16:creationId xmlns:a16="http://schemas.microsoft.com/office/drawing/2014/main" id="{351189DE-4427-4C60-896A-8E0351FB23DE}"/>
               </a:ext>
             </a:extLst>
           </p:cNvPr>
@@ -4194,13 +4212,7 @@
           <a:p>
             <a:r>
               <a:rPr lang="fr-FR" dirty="0"/>
-              <a:t>Le nom de la page de contact est « page2 ». Ce n’est pas explicite ni pour Google ni pour les visiteurs.</a:t>
-            </a:r>
-          </a:p>
-          <a:p>
-            <a:r>
-              <a:rPr lang="fr-FR" dirty="0"/>
-              <a:t>Elle a été remplacée par:  « contact »</a:t>
+              <a:t>Certaines phrases dans la page sont implémentés sous forme d’image. CA augmente le temps de chargement de la page car les images sont plus lourdes que le texte brute, et ça impacte donc le SEO car le temps de chargement de la page est un critère important pour Google. En plus, les images sont moins pratiques pour adapter le texte sur petits écrans (responsive). De plus, les lecteurs d’écran ne pourront pas lire le texte dans l’image pour les malvoyants. Enfin,  au format texte, on pourra inclure des mots clés pertinents qui ne seront pas reconnus par Google au format image.</a:t>
             </a:r>
           </a:p>
         </p:txBody>
@@ -4208,7 +4220,7 @@
     </p:spTree>
     <p:extLst>
       <p:ext uri="{BB962C8B-B14F-4D97-AF65-F5344CB8AC3E}">
-        <p14:creationId xmlns:p14="http://schemas.microsoft.com/office/powerpoint/2010/main" val="1949017567"/>
+        <p14:creationId xmlns:p14="http://schemas.microsoft.com/office/powerpoint/2010/main" val="1584401365"/>
       </p:ext>
     </p:extLst>
   </p:cSld>
@@ -4240,7 +4252,7 @@
           <p:cNvPr id="2" name="Titre 1">
             <a:extLst>
               <a:ext uri="{FF2B5EF4-FFF2-40B4-BE49-F238E27FC236}">
-                <a16:creationId xmlns:a16="http://schemas.microsoft.com/office/drawing/2014/main" id="{F01415BB-62D8-4B37-AEFE-96476F58EE1F}"/>
+                <a16:creationId xmlns:a16="http://schemas.microsoft.com/office/drawing/2014/main" id="{5EA6563D-5AAA-4444-AA4B-99CA74C1A647}"/>
               </a:ext>
             </a:extLst>
           </p:cNvPr>
@@ -4258,15 +4270,23 @@
           <a:p>
             <a:r>
               <a:rPr lang="fr-FR" dirty="0"/>
-              <a:t>9-Technique </a:t>
+              <a:t>7-&lt;</a:t>
             </a:r>
             <a:r>
               <a:rPr lang="fr-FR" dirty="0" err="1"/>
-              <a:t>blackhat</a:t>
+              <a:t>meta</a:t>
             </a:r>
             <a:r>
               <a:rPr lang="fr-FR" dirty="0"/>
-              <a:t> : mots clés en petit sur fond blanc</a:t>
+              <a:t> </a:t>
+            </a:r>
+            <a:r>
+              <a:rPr lang="fr-FR" dirty="0" err="1"/>
+              <a:t>name</a:t>
+            </a:r>
+            <a:r>
+              <a:rPr lang="fr-FR" dirty="0"/>
+              <a:t>="keywords" content="[...]"&gt;</a:t>
             </a:r>
           </a:p>
         </p:txBody>
@@ -4276,7 +4296,7 @@
           <p:cNvPr id="3" name="Espace réservé du contenu 2">
             <a:extLst>
               <a:ext uri="{FF2B5EF4-FFF2-40B4-BE49-F238E27FC236}">
-                <a16:creationId xmlns:a16="http://schemas.microsoft.com/office/drawing/2014/main" id="{FF95F175-EDEE-4D94-9FD8-CC1C1D10F19F}"/>
+                <a16:creationId xmlns:a16="http://schemas.microsoft.com/office/drawing/2014/main" id="{087799E5-AA99-4EB5-8A44-D8E0C1F5AC27}"/>
               </a:ext>
             </a:extLst>
           </p:cNvPr>
@@ -4294,7 +4314,7 @@
           <a:p>
             <a:r>
               <a:rPr lang="fr-FR" dirty="0"/>
-              <a:t>La div avec la classe « keywords » contient une succession de mots clés sans contexte, il s’agit d’une technique malicieuse pour booster artificiellement son référencement mais Google peut détecter les plus grossières dont celle-ci. En plus de rien rapporter, Google attribuera un malus à votre page qu’il sera difficile à faire enlever.</a:t>
+              <a:t>La balise Keywords est dépréciée aujourd’hui. Au mieux elle n’est pas prise en compte, au pire cela peut-être sanctionné si il y a trop de mots clés dans la balise.</a:t>
             </a:r>
           </a:p>
         </p:txBody>
@@ -4302,7 +4322,7 @@
     </p:spTree>
     <p:extLst>
       <p:ext uri="{BB962C8B-B14F-4D97-AF65-F5344CB8AC3E}">
-        <p14:creationId xmlns:p14="http://schemas.microsoft.com/office/powerpoint/2010/main" val="1032213200"/>
+        <p14:creationId xmlns:p14="http://schemas.microsoft.com/office/powerpoint/2010/main" val="3584817504"/>
       </p:ext>
     </p:extLst>
   </p:cSld>
@@ -4334,6 +4354,192 @@
           <p:cNvPr id="2" name="Titre 1">
             <a:extLst>
               <a:ext uri="{FF2B5EF4-FFF2-40B4-BE49-F238E27FC236}">
+                <a16:creationId xmlns:a16="http://schemas.microsoft.com/office/drawing/2014/main" id="{8BD9F299-88A2-464C-B7BE-0D78EBBAC5A1}"/>
+              </a:ext>
+            </a:extLst>
+          </p:cNvPr>
+          <p:cNvSpPr>
+            <a:spLocks noGrp="1"/>
+          </p:cNvSpPr>
+          <p:nvPr>
+            <p:ph type="title"/>
+          </p:nvPr>
+        </p:nvSpPr>
+        <p:spPr/>
+        <p:txBody>
+          <a:bodyPr/>
+          <a:lstStyle/>
+          <a:p>
+            <a:r>
+              <a:rPr lang="fr-FR" dirty="0"/>
+              <a:t>8-Le nom de la page de contact</a:t>
+            </a:r>
+          </a:p>
+        </p:txBody>
+      </p:sp>
+      <p:sp>
+        <p:nvSpPr>
+          <p:cNvPr id="3" name="Espace réservé du contenu 2">
+            <a:extLst>
+              <a:ext uri="{FF2B5EF4-FFF2-40B4-BE49-F238E27FC236}">
+                <a16:creationId xmlns:a16="http://schemas.microsoft.com/office/drawing/2014/main" id="{ED69E767-A1CB-4D6C-A315-C8D7249555CE}"/>
+              </a:ext>
+            </a:extLst>
+          </p:cNvPr>
+          <p:cNvSpPr>
+            <a:spLocks noGrp="1"/>
+          </p:cNvSpPr>
+          <p:nvPr>
+            <p:ph idx="1"/>
+          </p:nvPr>
+        </p:nvSpPr>
+        <p:spPr/>
+        <p:txBody>
+          <a:bodyPr/>
+          <a:lstStyle/>
+          <a:p>
+            <a:r>
+              <a:rPr lang="fr-FR" dirty="0"/>
+              <a:t>Le nom de la page de contact est « page2 ». Ce n’est pas explicite ni pour Google ni pour les visiteurs.</a:t>
+            </a:r>
+          </a:p>
+          <a:p>
+            <a:r>
+              <a:rPr lang="fr-FR" dirty="0"/>
+              <a:t>Elle a été remplacée par:  « contact »</a:t>
+            </a:r>
+          </a:p>
+        </p:txBody>
+      </p:sp>
+    </p:spTree>
+    <p:extLst>
+      <p:ext uri="{BB962C8B-B14F-4D97-AF65-F5344CB8AC3E}">
+        <p14:creationId xmlns:p14="http://schemas.microsoft.com/office/powerpoint/2010/main" val="1949017567"/>
+      </p:ext>
+    </p:extLst>
+  </p:cSld>
+  <p:clrMapOvr>
+    <a:masterClrMapping/>
+  </p:clrMapOvr>
+</p:sld>
+</file>
+
+<file path=ppt/slides/slide17.xml><?xml version="1.0" encoding="utf-8"?>
+<p:sld xmlns:a="http://schemas.openxmlformats.org/drawingml/2006/main" xmlns:r="http://schemas.openxmlformats.org/officeDocument/2006/relationships" xmlns:p="http://schemas.openxmlformats.org/presentationml/2006/main">
+  <p:cSld>
+    <p:spTree>
+      <p:nvGrpSpPr>
+        <p:cNvPr id="1" name=""/>
+        <p:cNvGrpSpPr/>
+        <p:nvPr/>
+      </p:nvGrpSpPr>
+      <p:grpSpPr>
+        <a:xfrm>
+          <a:off x="0" y="0"/>
+          <a:ext cx="0" cy="0"/>
+          <a:chOff x="0" y="0"/>
+          <a:chExt cx="0" cy="0"/>
+        </a:xfrm>
+      </p:grpSpPr>
+      <p:sp>
+        <p:nvSpPr>
+          <p:cNvPr id="2" name="Titre 1">
+            <a:extLst>
+              <a:ext uri="{FF2B5EF4-FFF2-40B4-BE49-F238E27FC236}">
+                <a16:creationId xmlns:a16="http://schemas.microsoft.com/office/drawing/2014/main" id="{F01415BB-62D8-4B37-AEFE-96476F58EE1F}"/>
+              </a:ext>
+            </a:extLst>
+          </p:cNvPr>
+          <p:cNvSpPr>
+            <a:spLocks noGrp="1"/>
+          </p:cNvSpPr>
+          <p:nvPr>
+            <p:ph type="title"/>
+          </p:nvPr>
+        </p:nvSpPr>
+        <p:spPr/>
+        <p:txBody>
+          <a:bodyPr/>
+          <a:lstStyle/>
+          <a:p>
+            <a:r>
+              <a:rPr lang="fr-FR" dirty="0"/>
+              <a:t>9-Technique </a:t>
+            </a:r>
+            <a:r>
+              <a:rPr lang="fr-FR" dirty="0" err="1"/>
+              <a:t>blackhat</a:t>
+            </a:r>
+            <a:r>
+              <a:rPr lang="fr-FR" dirty="0"/>
+              <a:t> : mots clés en petit sur fond blanc</a:t>
+            </a:r>
+          </a:p>
+        </p:txBody>
+      </p:sp>
+      <p:sp>
+        <p:nvSpPr>
+          <p:cNvPr id="3" name="Espace réservé du contenu 2">
+            <a:extLst>
+              <a:ext uri="{FF2B5EF4-FFF2-40B4-BE49-F238E27FC236}">
+                <a16:creationId xmlns:a16="http://schemas.microsoft.com/office/drawing/2014/main" id="{FF95F175-EDEE-4D94-9FD8-CC1C1D10F19F}"/>
+              </a:ext>
+            </a:extLst>
+          </p:cNvPr>
+          <p:cNvSpPr>
+            <a:spLocks noGrp="1"/>
+          </p:cNvSpPr>
+          <p:nvPr>
+            <p:ph idx="1"/>
+          </p:nvPr>
+        </p:nvSpPr>
+        <p:spPr/>
+        <p:txBody>
+          <a:bodyPr/>
+          <a:lstStyle/>
+          <a:p>
+            <a:r>
+              <a:rPr lang="fr-FR" dirty="0"/>
+              <a:t>La div avec la classe « keywords » contient une succession de mots clés sans contexte, il s’agit d’une technique malicieuse pour booster artificiellement son référencement mais Google peut détecter les plus grossières dont celle-ci. En plus de rien rapporter, Google attribuera un malus à votre page qu’il sera difficile à faire enlever.</a:t>
+            </a:r>
+          </a:p>
+        </p:txBody>
+      </p:sp>
+    </p:spTree>
+    <p:extLst>
+      <p:ext uri="{BB962C8B-B14F-4D97-AF65-F5344CB8AC3E}">
+        <p14:creationId xmlns:p14="http://schemas.microsoft.com/office/powerpoint/2010/main" val="1032213200"/>
+      </p:ext>
+    </p:extLst>
+  </p:cSld>
+  <p:clrMapOvr>
+    <a:masterClrMapping/>
+  </p:clrMapOvr>
+</p:sld>
+</file>
+
+<file path=ppt/slides/slide18.xml><?xml version="1.0" encoding="utf-8"?>
+<p:sld xmlns:a="http://schemas.openxmlformats.org/drawingml/2006/main" xmlns:r="http://schemas.openxmlformats.org/officeDocument/2006/relationships" xmlns:p="http://schemas.openxmlformats.org/presentationml/2006/main">
+  <p:cSld>
+    <p:spTree>
+      <p:nvGrpSpPr>
+        <p:cNvPr id="1" name=""/>
+        <p:cNvGrpSpPr/>
+        <p:nvPr/>
+      </p:nvGrpSpPr>
+      <p:grpSpPr>
+        <a:xfrm>
+          <a:off x="0" y="0"/>
+          <a:ext cx="0" cy="0"/>
+          <a:chOff x="0" y="0"/>
+          <a:chExt cx="0" cy="0"/>
+        </a:xfrm>
+      </p:grpSpPr>
+      <p:sp>
+        <p:nvSpPr>
+          <p:cNvPr id="2" name="Titre 1">
+            <a:extLst>
+              <a:ext uri="{FF2B5EF4-FFF2-40B4-BE49-F238E27FC236}">
                 <a16:creationId xmlns:a16="http://schemas.microsoft.com/office/drawing/2014/main" id="{DC00E362-A1C5-47B9-826D-135F2E9F6ADF}"/>
               </a:ext>
             </a:extLst>
@@ -4398,7 +4604,7 @@
 </p:sld>
 </file>
 
-<file path=ppt/slides/slide17.xml><?xml version="1.0" encoding="utf-8"?>
+<file path=ppt/slides/slide19.xml><?xml version="1.0" encoding="utf-8"?>
 <p:sld xmlns:a="http://schemas.openxmlformats.org/drawingml/2006/main" xmlns:r="http://schemas.openxmlformats.org/officeDocument/2006/relationships" xmlns:p="http://schemas.openxmlformats.org/presentationml/2006/main">
   <p:cSld>
     <p:spTree>
@@ -4733,6 +4939,266 @@
           <p:cNvPr id="2" name="Titre 1">
             <a:extLst>
               <a:ext uri="{FF2B5EF4-FFF2-40B4-BE49-F238E27FC236}">
+                <a16:creationId xmlns:a16="http://schemas.microsoft.com/office/drawing/2014/main" id="{B3E740AE-23E4-4595-A25D-10A297ADD273}"/>
+              </a:ext>
+            </a:extLst>
+          </p:cNvPr>
+          <p:cNvSpPr>
+            <a:spLocks noGrp="1"/>
+          </p:cNvSpPr>
+          <p:nvPr>
+            <p:ph type="title"/>
+          </p:nvPr>
+        </p:nvSpPr>
+        <p:spPr/>
+        <p:txBody>
+          <a:bodyPr/>
+          <a:lstStyle/>
+          <a:p>
+            <a:r>
+              <a:rPr lang="fr-FR" dirty="0"/>
+              <a:t>Mesure de performance sur </a:t>
+            </a:r>
+            <a:r>
+              <a:rPr lang="fr-FR" dirty="0" err="1"/>
+              <a:t>wave</a:t>
+            </a:r>
+            <a:endParaRPr lang="fr-FR" dirty="0"/>
+          </a:p>
+        </p:txBody>
+      </p:sp>
+      <p:pic>
+        <p:nvPicPr>
+          <p:cNvPr id="5" name="Espace réservé du contenu 4">
+            <a:extLst>
+              <a:ext uri="{FF2B5EF4-FFF2-40B4-BE49-F238E27FC236}">
+                <a16:creationId xmlns:a16="http://schemas.microsoft.com/office/drawing/2014/main" id="{B30E8BC4-81A8-44F0-95D9-182D3662A8E4}"/>
+              </a:ext>
+            </a:extLst>
+          </p:cNvPr>
+          <p:cNvPicPr>
+            <a:picLocks noGrp="1" noChangeAspect="1"/>
+          </p:cNvPicPr>
+          <p:nvPr>
+            <p:ph idx="1"/>
+          </p:nvPr>
+        </p:nvPicPr>
+        <p:blipFill>
+          <a:blip r:embed="rId2">
+            <a:extLst>
+              <a:ext uri="{28A0092B-C50C-407E-A947-70E740481C1C}">
+                <a14:useLocalDpi xmlns:a14="http://schemas.microsoft.com/office/drawing/2010/main" val="0"/>
+              </a:ext>
+            </a:extLst>
+          </a:blip>
+          <a:stretch>
+            <a:fillRect/>
+          </a:stretch>
+        </p:blipFill>
+        <p:spPr>
+          <a:xfrm>
+            <a:off x="4951938" y="1874346"/>
+            <a:ext cx="2288123" cy="4179135"/>
+          </a:xfrm>
+        </p:spPr>
+      </p:pic>
+      <p:sp>
+        <p:nvSpPr>
+          <p:cNvPr id="6" name="ZoneTexte 5">
+            <a:extLst>
+              <a:ext uri="{FF2B5EF4-FFF2-40B4-BE49-F238E27FC236}">
+                <a16:creationId xmlns:a16="http://schemas.microsoft.com/office/drawing/2014/main" id="{8C67A6EF-710B-498B-BE0A-E7670DB48D8B}"/>
+              </a:ext>
+            </a:extLst>
+          </p:cNvPr>
+          <p:cNvSpPr txBox="1"/>
+          <p:nvPr/>
+        </p:nvSpPr>
+        <p:spPr>
+          <a:xfrm>
+            <a:off x="1451579" y="2159000"/>
+            <a:ext cx="2635183" cy="369332"/>
+          </a:xfrm>
+          <a:prstGeom prst="rect">
+            <a:avLst/>
+          </a:prstGeom>
+          <a:noFill/>
+        </p:spPr>
+        <p:txBody>
+          <a:bodyPr wrap="square" rtlCol="0">
+            <a:spAutoFit/>
+          </a:bodyPr>
+          <a:lstStyle/>
+          <a:p>
+            <a:r>
+              <a:rPr lang="fr-FR" dirty="0"/>
+              <a:t>Avant:</a:t>
+            </a:r>
+          </a:p>
+        </p:txBody>
+      </p:sp>
+    </p:spTree>
+    <p:extLst>
+      <p:ext uri="{BB962C8B-B14F-4D97-AF65-F5344CB8AC3E}">
+        <p14:creationId xmlns:p14="http://schemas.microsoft.com/office/powerpoint/2010/main" val="2995031672"/>
+      </p:ext>
+    </p:extLst>
+  </p:cSld>
+  <p:clrMapOvr>
+    <a:masterClrMapping/>
+  </p:clrMapOvr>
+</p:sld>
+</file>
+
+<file path=ppt/slides/slide5.xml><?xml version="1.0" encoding="utf-8"?>
+<p:sld xmlns:a="http://schemas.openxmlformats.org/drawingml/2006/main" xmlns:r="http://schemas.openxmlformats.org/officeDocument/2006/relationships" xmlns:p="http://schemas.openxmlformats.org/presentationml/2006/main">
+  <p:cSld>
+    <p:spTree>
+      <p:nvGrpSpPr>
+        <p:cNvPr id="1" name=""/>
+        <p:cNvGrpSpPr/>
+        <p:nvPr/>
+      </p:nvGrpSpPr>
+      <p:grpSpPr>
+        <a:xfrm>
+          <a:off x="0" y="0"/>
+          <a:ext cx="0" cy="0"/>
+          <a:chOff x="0" y="0"/>
+          <a:chExt cx="0" cy="0"/>
+        </a:xfrm>
+      </p:grpSpPr>
+      <p:sp>
+        <p:nvSpPr>
+          <p:cNvPr id="2" name="Titre 1">
+            <a:extLst>
+              <a:ext uri="{FF2B5EF4-FFF2-40B4-BE49-F238E27FC236}">
+                <a16:creationId xmlns:a16="http://schemas.microsoft.com/office/drawing/2014/main" id="{62F41970-888F-4B8E-8A4F-9B1D6AA228A9}"/>
+              </a:ext>
+            </a:extLst>
+          </p:cNvPr>
+          <p:cNvSpPr>
+            <a:spLocks noGrp="1"/>
+          </p:cNvSpPr>
+          <p:nvPr>
+            <p:ph type="title"/>
+          </p:nvPr>
+        </p:nvSpPr>
+        <p:spPr/>
+        <p:txBody>
+          <a:bodyPr/>
+          <a:lstStyle/>
+          <a:p>
+            <a:r>
+              <a:rPr lang="fr-FR" dirty="0"/>
+              <a:t>Mesure de performance sur </a:t>
+            </a:r>
+            <a:r>
+              <a:rPr lang="fr-FR" dirty="0" err="1"/>
+              <a:t>wave</a:t>
+            </a:r>
+            <a:endParaRPr lang="fr-FR" dirty="0"/>
+          </a:p>
+        </p:txBody>
+      </p:sp>
+      <p:sp>
+        <p:nvSpPr>
+          <p:cNvPr id="3" name="Espace réservé du contenu 2">
+            <a:extLst>
+              <a:ext uri="{FF2B5EF4-FFF2-40B4-BE49-F238E27FC236}">
+                <a16:creationId xmlns:a16="http://schemas.microsoft.com/office/drawing/2014/main" id="{86320096-369F-4FCB-83F1-55CBCE7C83EC}"/>
+              </a:ext>
+            </a:extLst>
+          </p:cNvPr>
+          <p:cNvSpPr>
+            <a:spLocks noGrp="1"/>
+          </p:cNvSpPr>
+          <p:nvPr>
+            <p:ph idx="1"/>
+          </p:nvPr>
+        </p:nvSpPr>
+        <p:spPr/>
+        <p:txBody>
+          <a:bodyPr/>
+          <a:lstStyle/>
+          <a:p>
+            <a:r>
+              <a:rPr lang="fr-FR" dirty="0"/>
+              <a:t>Après:</a:t>
+            </a:r>
+          </a:p>
+        </p:txBody>
+      </p:sp>
+      <p:pic>
+        <p:nvPicPr>
+          <p:cNvPr id="5" name="Image 4">
+            <a:extLst>
+              <a:ext uri="{FF2B5EF4-FFF2-40B4-BE49-F238E27FC236}">
+                <a16:creationId xmlns:a16="http://schemas.microsoft.com/office/drawing/2014/main" id="{3D2D3766-7245-4CE1-933B-00D284C2D190}"/>
+              </a:ext>
+            </a:extLst>
+          </p:cNvPr>
+          <p:cNvPicPr>
+            <a:picLocks noChangeAspect="1"/>
+          </p:cNvPicPr>
+          <p:nvPr/>
+        </p:nvPicPr>
+        <p:blipFill>
+          <a:blip r:embed="rId2">
+            <a:extLst>
+              <a:ext uri="{28A0092B-C50C-407E-A947-70E740481C1C}">
+                <a14:useLocalDpi xmlns:a14="http://schemas.microsoft.com/office/drawing/2010/main" val="0"/>
+              </a:ext>
+            </a:extLst>
+          </a:blip>
+          <a:stretch>
+            <a:fillRect/>
+          </a:stretch>
+        </p:blipFill>
+        <p:spPr>
+          <a:xfrm>
+            <a:off x="4919134" y="1867229"/>
+            <a:ext cx="2272598" cy="4159593"/>
+          </a:xfrm>
+          <a:prstGeom prst="rect">
+            <a:avLst/>
+          </a:prstGeom>
+        </p:spPr>
+      </p:pic>
+    </p:spTree>
+    <p:extLst>
+      <p:ext uri="{BB962C8B-B14F-4D97-AF65-F5344CB8AC3E}">
+        <p14:creationId xmlns:p14="http://schemas.microsoft.com/office/powerpoint/2010/main" val="3568261620"/>
+      </p:ext>
+    </p:extLst>
+  </p:cSld>
+  <p:clrMapOvr>
+    <a:masterClrMapping/>
+  </p:clrMapOvr>
+</p:sld>
+</file>
+
+<file path=ppt/slides/slide6.xml><?xml version="1.0" encoding="utf-8"?>
+<p:sld xmlns:a="http://schemas.openxmlformats.org/drawingml/2006/main" xmlns:r="http://schemas.openxmlformats.org/officeDocument/2006/relationships" xmlns:p="http://schemas.openxmlformats.org/presentationml/2006/main">
+  <p:cSld>
+    <p:spTree>
+      <p:nvGrpSpPr>
+        <p:cNvPr id="1" name=""/>
+        <p:cNvGrpSpPr/>
+        <p:nvPr/>
+      </p:nvGrpSpPr>
+      <p:grpSpPr>
+        <a:xfrm>
+          <a:off x="0" y="0"/>
+          <a:ext cx="0" cy="0"/>
+          <a:chOff x="0" y="0"/>
+          <a:chExt cx="0" cy="0"/>
+        </a:xfrm>
+      </p:grpSpPr>
+      <p:sp>
+        <p:nvSpPr>
+          <p:cNvPr id="2" name="Titre 1">
+            <a:extLst>
+              <a:ext uri="{FF2B5EF4-FFF2-40B4-BE49-F238E27FC236}">
                 <a16:creationId xmlns:a16="http://schemas.microsoft.com/office/drawing/2014/main" id="{172B957F-C9F4-4A44-BE15-D3A1486F3BBD}"/>
               </a:ext>
             </a:extLst>
@@ -4838,7 +5304,7 @@
 </p:sld>
 </file>
 
-<file path=ppt/slides/slide5.xml><?xml version="1.0" encoding="utf-8"?>
+<file path=ppt/slides/slide7.xml><?xml version="1.0" encoding="utf-8"?>
 <p:sld xmlns:a="http://schemas.openxmlformats.org/drawingml/2006/main" xmlns:r="http://schemas.openxmlformats.org/officeDocument/2006/relationships" xmlns:p="http://schemas.openxmlformats.org/presentationml/2006/main">
   <p:cSld>
     <p:spTree>
@@ -4965,151 +5431,6 @@
 </p:sld>
 </file>
 
-<file path=ppt/slides/slide6.xml><?xml version="1.0" encoding="utf-8"?>
-<p:sld xmlns:a="http://schemas.openxmlformats.org/drawingml/2006/main" xmlns:r="http://schemas.openxmlformats.org/officeDocument/2006/relationships" xmlns:p="http://schemas.openxmlformats.org/presentationml/2006/main">
-  <p:cSld>
-    <p:spTree>
-      <p:nvGrpSpPr>
-        <p:cNvPr id="1" name=""/>
-        <p:cNvGrpSpPr/>
-        <p:nvPr/>
-      </p:nvGrpSpPr>
-      <p:grpSpPr>
-        <a:xfrm>
-          <a:off x="0" y="0"/>
-          <a:ext cx="0" cy="0"/>
-          <a:chOff x="0" y="0"/>
-          <a:chExt cx="0" cy="0"/>
-        </a:xfrm>
-      </p:grpSpPr>
-      <p:sp>
-        <p:nvSpPr>
-          <p:cNvPr id="2" name="Titre 1">
-            <a:extLst>
-              <a:ext uri="{FF2B5EF4-FFF2-40B4-BE49-F238E27FC236}">
-                <a16:creationId xmlns:a16="http://schemas.microsoft.com/office/drawing/2014/main" id="{CA27DFF1-3C88-4403-A7EA-BF8C05B82E3E}"/>
-              </a:ext>
-            </a:extLst>
-          </p:cNvPr>
-          <p:cNvSpPr>
-            <a:spLocks noGrp="1"/>
-          </p:cNvSpPr>
-          <p:nvPr>
-            <p:ph type="title"/>
-          </p:nvPr>
-        </p:nvSpPr>
-        <p:spPr/>
-        <p:txBody>
-          <a:bodyPr/>
-          <a:lstStyle/>
-          <a:p>
-            <a:pPr algn="ctr"/>
-            <a:r>
-              <a:rPr lang="fr-FR" dirty="0"/>
-              <a:t>Liste des dix améliorations apportées</a:t>
-            </a:r>
-          </a:p>
-        </p:txBody>
-      </p:sp>
-    </p:spTree>
-    <p:extLst>
-      <p:ext uri="{BB962C8B-B14F-4D97-AF65-F5344CB8AC3E}">
-        <p14:creationId xmlns:p14="http://schemas.microsoft.com/office/powerpoint/2010/main" val="3024134250"/>
-      </p:ext>
-    </p:extLst>
-  </p:cSld>
-  <p:clrMapOvr>
-    <a:masterClrMapping/>
-  </p:clrMapOvr>
-</p:sld>
-</file>
-
-<file path=ppt/slides/slide7.xml><?xml version="1.0" encoding="utf-8"?>
-<p:sld xmlns:a="http://schemas.openxmlformats.org/drawingml/2006/main" xmlns:r="http://schemas.openxmlformats.org/officeDocument/2006/relationships" xmlns:p="http://schemas.openxmlformats.org/presentationml/2006/main">
-  <p:cSld>
-    <p:spTree>
-      <p:nvGrpSpPr>
-        <p:cNvPr id="1" name=""/>
-        <p:cNvGrpSpPr/>
-        <p:nvPr/>
-      </p:nvGrpSpPr>
-      <p:grpSpPr>
-        <a:xfrm>
-          <a:off x="0" y="0"/>
-          <a:ext cx="0" cy="0"/>
-          <a:chOff x="0" y="0"/>
-          <a:chExt cx="0" cy="0"/>
-        </a:xfrm>
-      </p:grpSpPr>
-      <p:sp>
-        <p:nvSpPr>
-          <p:cNvPr id="2" name="Titre 1">
-            <a:extLst>
-              <a:ext uri="{FF2B5EF4-FFF2-40B4-BE49-F238E27FC236}">
-                <a16:creationId xmlns:a16="http://schemas.microsoft.com/office/drawing/2014/main" id="{2E72794D-ABDE-4528-AC6C-7DCF9A3EDED6}"/>
-              </a:ext>
-            </a:extLst>
-          </p:cNvPr>
-          <p:cNvSpPr>
-            <a:spLocks noGrp="1"/>
-          </p:cNvSpPr>
-          <p:nvPr>
-            <p:ph type="title"/>
-          </p:nvPr>
-        </p:nvSpPr>
-        <p:spPr/>
-        <p:txBody>
-          <a:bodyPr/>
-          <a:lstStyle/>
-          <a:p>
-            <a:r>
-              <a:rPr lang="fr-FR" dirty="0"/>
-              <a:t>1-lang= « default »</a:t>
-            </a:r>
-          </a:p>
-        </p:txBody>
-      </p:sp>
-      <p:sp>
-        <p:nvSpPr>
-          <p:cNvPr id="3" name="Espace réservé du contenu 2">
-            <a:extLst>
-              <a:ext uri="{FF2B5EF4-FFF2-40B4-BE49-F238E27FC236}">
-                <a16:creationId xmlns:a16="http://schemas.microsoft.com/office/drawing/2014/main" id="{061EEC17-9278-4D67-AA72-BE3EE0E27FDA}"/>
-              </a:ext>
-            </a:extLst>
-          </p:cNvPr>
-          <p:cNvSpPr>
-            <a:spLocks noGrp="1"/>
-          </p:cNvSpPr>
-          <p:nvPr>
-            <p:ph idx="1"/>
-          </p:nvPr>
-        </p:nvSpPr>
-        <p:spPr/>
-        <p:txBody>
-          <a:bodyPr/>
-          <a:lstStyle/>
-          <a:p>
-            <a:r>
-              <a:rPr lang="fr-FR" dirty="0"/>
-              <a:t>Le langage de la page n’est pas déclaré, Google ne détecte donc pas automatiquement la langue de la page</a:t>
-            </a:r>
-          </a:p>
-        </p:txBody>
-      </p:sp>
-    </p:spTree>
-    <p:extLst>
-      <p:ext uri="{BB962C8B-B14F-4D97-AF65-F5344CB8AC3E}">
-        <p14:creationId xmlns:p14="http://schemas.microsoft.com/office/powerpoint/2010/main" val="2625562521"/>
-      </p:ext>
-    </p:extLst>
-  </p:cSld>
-  <p:clrMapOvr>
-    <a:masterClrMapping/>
-  </p:clrMapOvr>
-</p:sld>
-</file>
-
 <file path=ppt/slides/slide8.xml><?xml version="1.0" encoding="utf-8"?>
 <p:sld xmlns:a="http://schemas.openxmlformats.org/drawingml/2006/main" xmlns:r="http://schemas.openxmlformats.org/officeDocument/2006/relationships" xmlns:p="http://schemas.openxmlformats.org/presentationml/2006/main">
   <p:cSld>
@@ -5132,7 +5453,7 @@
           <p:cNvPr id="2" name="Titre 1">
             <a:extLst>
               <a:ext uri="{FF2B5EF4-FFF2-40B4-BE49-F238E27FC236}">
-                <a16:creationId xmlns:a16="http://schemas.microsoft.com/office/drawing/2014/main" id="{5F33EB2F-A620-4283-AF37-8284E33BE126}"/>
+                <a16:creationId xmlns:a16="http://schemas.microsoft.com/office/drawing/2014/main" id="{CA27DFF1-3C88-4403-A7EA-BF8C05B82E3E}"/>
               </a:ext>
             </a:extLst>
           </p:cNvPr>
@@ -5148,69 +5469,10 @@
           <a:bodyPr/>
           <a:lstStyle/>
           <a:p>
+            <a:pPr algn="ctr"/>
             <a:r>
               <a:rPr lang="fr-FR" dirty="0"/>
-              <a:t>2-balise &lt;</a:t>
-            </a:r>
-            <a:r>
-              <a:rPr lang="fr-FR" dirty="0" err="1"/>
-              <a:t>title</a:t>
-            </a:r>
-            <a:r>
-              <a:rPr lang="fr-FR" dirty="0"/>
-              <a:t>&gt;&lt;/</a:t>
-            </a:r>
-            <a:r>
-              <a:rPr lang="fr-FR" dirty="0" err="1"/>
-              <a:t>title</a:t>
-            </a:r>
-            <a:r>
-              <a:rPr lang="fr-FR" dirty="0"/>
-              <a:t>&gt;</a:t>
-            </a:r>
-          </a:p>
-        </p:txBody>
-      </p:sp>
-      <p:sp>
-        <p:nvSpPr>
-          <p:cNvPr id="3" name="Espace réservé du contenu 2">
-            <a:extLst>
-              <a:ext uri="{FF2B5EF4-FFF2-40B4-BE49-F238E27FC236}">
-                <a16:creationId xmlns:a16="http://schemas.microsoft.com/office/drawing/2014/main" id="{490E0A6D-5595-428E-99FF-84C3E85E0E13}"/>
-              </a:ext>
-            </a:extLst>
-          </p:cNvPr>
-          <p:cNvSpPr>
-            <a:spLocks noGrp="1"/>
-          </p:cNvSpPr>
-          <p:nvPr>
-            <p:ph idx="1"/>
-          </p:nvPr>
-        </p:nvSpPr>
-        <p:spPr/>
-        <p:txBody>
-          <a:bodyPr/>
-          <a:lstStyle/>
-          <a:p>
-            <a:r>
-              <a:rPr lang="fr-FR" dirty="0"/>
-              <a:t>La balise </a:t>
-            </a:r>
-            <a:r>
-              <a:rPr lang="fr-FR" dirty="0" err="1"/>
-              <a:t>title</a:t>
-            </a:r>
-            <a:r>
-              <a:rPr lang="fr-FR" dirty="0"/>
-              <a:t> est l’une des balises les plus importantes pour Google car elle sert à définir le sujet / but principal de la page. Un point n’est pas explicite. Le </a:t>
-            </a:r>
-            <a:r>
-              <a:rPr lang="fr-FR" dirty="0" err="1"/>
-              <a:t>title</a:t>
-            </a:r>
-            <a:r>
-              <a:rPr lang="fr-FR" dirty="0"/>
-              <a:t> sera d’ailleurs aussi affiché sur les résultats de recherches de Google, il faut donc que les utilisateurs aussi comprennent le but de la page pour cliquer.</a:t>
+              <a:t>Liste des dix améliorations apportées</a:t>
             </a:r>
           </a:p>
         </p:txBody>
@@ -5218,7 +5480,7 @@
     </p:spTree>
     <p:extLst>
       <p:ext uri="{BB962C8B-B14F-4D97-AF65-F5344CB8AC3E}">
-        <p14:creationId xmlns:p14="http://schemas.microsoft.com/office/powerpoint/2010/main" val="1889303693"/>
+        <p14:creationId xmlns:p14="http://schemas.microsoft.com/office/powerpoint/2010/main" val="3024134250"/>
       </p:ext>
     </p:extLst>
   </p:cSld>
@@ -5250,7 +5512,7 @@
           <p:cNvPr id="2" name="Titre 1">
             <a:extLst>
               <a:ext uri="{FF2B5EF4-FFF2-40B4-BE49-F238E27FC236}">
-                <a16:creationId xmlns:a16="http://schemas.microsoft.com/office/drawing/2014/main" id="{47EA7F8F-07F8-43C0-97E2-E65BFEF9F59F}"/>
+                <a16:creationId xmlns:a16="http://schemas.microsoft.com/office/drawing/2014/main" id="{2E72794D-ABDE-4528-AC6C-7DCF9A3EDED6}"/>
               </a:ext>
             </a:extLst>
           </p:cNvPr>
@@ -5268,7 +5530,7 @@
           <a:p>
             <a:r>
               <a:rPr lang="fr-FR" dirty="0"/>
-              <a:t>3-Textes sous forme d’image</a:t>
+              <a:t>1-lang= « default »</a:t>
             </a:r>
           </a:p>
         </p:txBody>
@@ -5278,7 +5540,7 @@
           <p:cNvPr id="3" name="Espace réservé du contenu 2">
             <a:extLst>
               <a:ext uri="{FF2B5EF4-FFF2-40B4-BE49-F238E27FC236}">
-                <a16:creationId xmlns:a16="http://schemas.microsoft.com/office/drawing/2014/main" id="{992E6C39-BF46-4688-9AD8-6F11465FC4E0}"/>
+                <a16:creationId xmlns:a16="http://schemas.microsoft.com/office/drawing/2014/main" id="{061EEC17-9278-4D67-AA72-BE3EE0E27FDA}"/>
               </a:ext>
             </a:extLst>
           </p:cNvPr>
@@ -5296,7 +5558,7 @@
           <a:p>
             <a:r>
               <a:rPr lang="fr-FR" dirty="0"/>
-              <a:t>Certaines phrases dans la page sont implémentées sous forme d’image. Ca augmente le temps de chargement de la page car les images sont plus lourdes que le texte brut, et ça impacte donc le SEO car le temps de chargement de la page est un critère important pour Google. En plus, les images sont moins pratiques pour adapter le texte sur petits écrans (responsive). De plus, les lecteurs d’écran ne pourront pas lire le texte dans l’image pour les malvoyants. Enfin,  au format texte, on pourra inclure des mots clés pertinents qui ne seront pas reconnus par Google au format image.</a:t>
+              <a:t>Le langage de la page n’est pas déclaré, Google ne détecte donc pas automatiquement la langue de la page</a:t>
             </a:r>
           </a:p>
         </p:txBody>
@@ -5304,7 +5566,7 @@
     </p:spTree>
     <p:extLst>
       <p:ext uri="{BB962C8B-B14F-4D97-AF65-F5344CB8AC3E}">
-        <p14:creationId xmlns:p14="http://schemas.microsoft.com/office/powerpoint/2010/main" val="434277876"/>
+        <p14:creationId xmlns:p14="http://schemas.microsoft.com/office/powerpoint/2010/main" val="2625562521"/>
       </p:ext>
     </p:extLst>
   </p:cSld>

</xml_diff>

<commit_message>
suppression de z-index et display inutiles
</commit_message>
<xml_diff>
--- a/audit/Présentation du projet 4.pptx
+++ b/audit/Présentation du projet 4.pptx
@@ -8,22 +8,32 @@
     <p:sldId id="256" r:id="rId2"/>
     <p:sldId id="257" r:id="rId3"/>
     <p:sldId id="258" r:id="rId4"/>
-    <p:sldId id="273" r:id="rId5"/>
-    <p:sldId id="274" r:id="rId6"/>
-    <p:sldId id="259" r:id="rId7"/>
-    <p:sldId id="260" r:id="rId8"/>
-    <p:sldId id="261" r:id="rId9"/>
-    <p:sldId id="262" r:id="rId10"/>
-    <p:sldId id="263" r:id="rId11"/>
-    <p:sldId id="264" r:id="rId12"/>
-    <p:sldId id="265" r:id="rId13"/>
-    <p:sldId id="266" r:id="rId14"/>
-    <p:sldId id="267" r:id="rId15"/>
-    <p:sldId id="268" r:id="rId16"/>
-    <p:sldId id="269" r:id="rId17"/>
-    <p:sldId id="270" r:id="rId18"/>
-    <p:sldId id="271" r:id="rId19"/>
-    <p:sldId id="272" r:id="rId20"/>
+    <p:sldId id="275" r:id="rId5"/>
+    <p:sldId id="278" r:id="rId6"/>
+    <p:sldId id="277" r:id="rId7"/>
+    <p:sldId id="281" r:id="rId8"/>
+    <p:sldId id="279" r:id="rId9"/>
+    <p:sldId id="282" r:id="rId10"/>
+    <p:sldId id="280" r:id="rId11"/>
+    <p:sldId id="283" r:id="rId12"/>
+    <p:sldId id="276" r:id="rId13"/>
+    <p:sldId id="284" r:id="rId14"/>
+    <p:sldId id="273" r:id="rId15"/>
+    <p:sldId id="274" r:id="rId16"/>
+    <p:sldId id="285" r:id="rId17"/>
+    <p:sldId id="286" r:id="rId18"/>
+    <p:sldId id="261" r:id="rId19"/>
+    <p:sldId id="262" r:id="rId20"/>
+    <p:sldId id="263" r:id="rId21"/>
+    <p:sldId id="264" r:id="rId22"/>
+    <p:sldId id="265" r:id="rId23"/>
+    <p:sldId id="266" r:id="rId24"/>
+    <p:sldId id="267" r:id="rId25"/>
+    <p:sldId id="268" r:id="rId26"/>
+    <p:sldId id="269" r:id="rId27"/>
+    <p:sldId id="270" r:id="rId28"/>
+    <p:sldId id="271" r:id="rId29"/>
+    <p:sldId id="272" r:id="rId30"/>
   </p:sldIdLst>
   <p:sldSz cx="12192000" cy="6858000"/>
   <p:notesSz cx="6858000" cy="9144000"/>
@@ -269,7 +279,7 @@
           <a:p>
             <a:fld id="{DB06F76C-9E2A-4FD2-8431-54A774AF261B}" type="datetimeFigureOut">
               <a:rPr lang="fr-FR" smtClean="0"/>
-              <a:t>31/01/2022</a:t>
+              <a:t>07/02/2022</a:t>
             </a:fld>
             <a:endParaRPr lang="fr-FR"/>
           </a:p>
@@ -480,7 +490,7 @@
           <a:p>
             <a:fld id="{DB06F76C-9E2A-4FD2-8431-54A774AF261B}" type="datetimeFigureOut">
               <a:rPr lang="fr-FR" smtClean="0"/>
-              <a:t>31/01/2022</a:t>
+              <a:t>07/02/2022</a:t>
             </a:fld>
             <a:endParaRPr lang="fr-FR"/>
           </a:p>
@@ -695,7 +705,7 @@
           <a:p>
             <a:fld id="{DB06F76C-9E2A-4FD2-8431-54A774AF261B}" type="datetimeFigureOut">
               <a:rPr lang="fr-FR" smtClean="0"/>
-              <a:t>31/01/2022</a:t>
+              <a:t>07/02/2022</a:t>
             </a:fld>
             <a:endParaRPr lang="fr-FR"/>
           </a:p>
@@ -896,7 +906,7 @@
           <a:p>
             <a:fld id="{DB06F76C-9E2A-4FD2-8431-54A774AF261B}" type="datetimeFigureOut">
               <a:rPr lang="fr-FR" smtClean="0"/>
-              <a:t>31/01/2022</a:t>
+              <a:t>07/02/2022</a:t>
             </a:fld>
             <a:endParaRPr lang="fr-FR"/>
           </a:p>
@@ -1175,7 +1185,7 @@
           <a:p>
             <a:fld id="{DB06F76C-9E2A-4FD2-8431-54A774AF261B}" type="datetimeFigureOut">
               <a:rPr lang="fr-FR" smtClean="0"/>
-              <a:t>31/01/2022</a:t>
+              <a:t>07/02/2022</a:t>
             </a:fld>
             <a:endParaRPr lang="fr-FR"/>
           </a:p>
@@ -1443,7 +1453,7 @@
           <a:p>
             <a:fld id="{DB06F76C-9E2A-4FD2-8431-54A774AF261B}" type="datetimeFigureOut">
               <a:rPr lang="fr-FR" smtClean="0"/>
-              <a:t>31/01/2022</a:t>
+              <a:t>07/02/2022</a:t>
             </a:fld>
             <a:endParaRPr lang="fr-FR"/>
           </a:p>
@@ -1859,7 +1869,7 @@
           <a:p>
             <a:fld id="{DB06F76C-9E2A-4FD2-8431-54A774AF261B}" type="datetimeFigureOut">
               <a:rPr lang="fr-FR" smtClean="0"/>
-              <a:t>31/01/2022</a:t>
+              <a:t>07/02/2022</a:t>
             </a:fld>
             <a:endParaRPr lang="fr-FR"/>
           </a:p>
@@ -2008,7 +2018,7 @@
           <a:p>
             <a:fld id="{DB06F76C-9E2A-4FD2-8431-54A774AF261B}" type="datetimeFigureOut">
               <a:rPr lang="fr-FR" smtClean="0"/>
-              <a:t>31/01/2022</a:t>
+              <a:t>07/02/2022</a:t>
             </a:fld>
             <a:endParaRPr lang="fr-FR"/>
           </a:p>
@@ -2134,7 +2144,7 @@
           <a:p>
             <a:fld id="{DB06F76C-9E2A-4FD2-8431-54A774AF261B}" type="datetimeFigureOut">
               <a:rPr lang="fr-FR" smtClean="0"/>
-              <a:t>31/01/2022</a:t>
+              <a:t>07/02/2022</a:t>
             </a:fld>
             <a:endParaRPr lang="fr-FR"/>
           </a:p>
@@ -2385,7 +2395,7 @@
           <a:p>
             <a:fld id="{DB06F76C-9E2A-4FD2-8431-54A774AF261B}" type="datetimeFigureOut">
               <a:rPr lang="fr-FR" smtClean="0"/>
-              <a:t>31/01/2022</a:t>
+              <a:t>07/02/2022</a:t>
             </a:fld>
             <a:endParaRPr lang="fr-FR"/>
           </a:p>
@@ -2830,7 +2840,7 @@
           <a:p>
             <a:fld id="{DB06F76C-9E2A-4FD2-8431-54A774AF261B}" type="datetimeFigureOut">
               <a:rPr lang="fr-FR" smtClean="0"/>
-              <a:t>31/01/2022</a:t>
+              <a:t>07/02/2022</a:t>
             </a:fld>
             <a:endParaRPr lang="fr-FR"/>
           </a:p>
@@ -3157,7 +3167,7 @@
           <a:p>
             <a:fld id="{DB06F76C-9E2A-4FD2-8431-54A774AF261B}" type="datetimeFigureOut">
               <a:rPr lang="fr-FR" smtClean="0"/>
-              <a:t>31/01/2022</a:t>
+              <a:t>07/02/2022</a:t>
             </a:fld>
             <a:endParaRPr lang="fr-FR"/>
           </a:p>
@@ -3774,7 +3784,7 @@
           <p:cNvPr id="2" name="Titre 1">
             <a:extLst>
               <a:ext uri="{FF2B5EF4-FFF2-40B4-BE49-F238E27FC236}">
-                <a16:creationId xmlns:a16="http://schemas.microsoft.com/office/drawing/2014/main" id="{5F33EB2F-A620-4283-AF37-8284E33BE126}"/>
+                <a16:creationId xmlns:a16="http://schemas.microsoft.com/office/drawing/2014/main" id="{44F8814E-5E79-4BEB-B575-39A7537D6A4D}"/>
               </a:ext>
             </a:extLst>
           </p:cNvPr>
@@ -3792,75 +3802,110 @@
           <a:p>
             <a:r>
               <a:rPr lang="fr-FR" dirty="0"/>
-              <a:t>2-balise &lt;</a:t>
+              <a:t>Mesure de performance sur </a:t>
             </a:r>
             <a:r>
               <a:rPr lang="fr-FR" dirty="0" err="1"/>
-              <a:t>title</a:t>
-            </a:r>
+              <a:t>uptrends</a:t>
+            </a:r>
+            <a:endParaRPr lang="fr-FR" dirty="0"/>
+          </a:p>
+        </p:txBody>
+      </p:sp>
+      <p:sp>
+        <p:nvSpPr>
+          <p:cNvPr id="3" name="Espace réservé du contenu 2">
+            <a:extLst>
+              <a:ext uri="{FF2B5EF4-FFF2-40B4-BE49-F238E27FC236}">
+                <a16:creationId xmlns:a16="http://schemas.microsoft.com/office/drawing/2014/main" id="{E862E730-A308-42EC-8483-405F9602377B}"/>
+              </a:ext>
+            </a:extLst>
+          </p:cNvPr>
+          <p:cNvSpPr>
+            <a:spLocks noGrp="1"/>
+          </p:cNvSpPr>
+          <p:nvPr>
+            <p:ph idx="1"/>
+          </p:nvPr>
+        </p:nvSpPr>
+        <p:spPr/>
+        <p:txBody>
+          <a:bodyPr/>
+          <a:lstStyle/>
+          <a:p>
             <a:r>
               <a:rPr lang="fr-FR" dirty="0"/>
-              <a:t>&gt;&lt;/</a:t>
-            </a:r>
+              <a:t>Avant améliorations</a:t>
+            </a:r>
+          </a:p>
+          <a:p>
+            <a:pPr lvl="1"/>
             <a:r>
               <a:rPr lang="fr-FR" dirty="0" err="1"/>
-              <a:t>title</a:t>
-            </a:r>
+              <a:t>Starter_web_site</a:t>
+            </a:r>
+            <a:endParaRPr lang="fr-FR" dirty="0"/>
+          </a:p>
+          <a:p>
+            <a:pPr lvl="2"/>
+            <a:r>
+              <a:rPr lang="fr-FR" dirty="0" err="1"/>
+              <a:t>Version_mobile</a:t>
+            </a:r>
+            <a:endParaRPr lang="fr-FR" dirty="0"/>
+          </a:p>
+          <a:p>
+            <a:pPr lvl="3"/>
             <a:r>
               <a:rPr lang="fr-FR" dirty="0"/>
-              <a:t>&gt;</a:t>
-            </a:r>
-          </a:p>
-        </p:txBody>
-      </p:sp>
-      <p:sp>
-        <p:nvSpPr>
-          <p:cNvPr id="3" name="Espace réservé du contenu 2">
+              <a:t>accueil</a:t>
+            </a:r>
+          </a:p>
+          <a:p>
+            <a:endParaRPr lang="fr-FR" dirty="0"/>
+          </a:p>
+        </p:txBody>
+      </p:sp>
+      <p:pic>
+        <p:nvPicPr>
+          <p:cNvPr id="5" name="Image 4">
             <a:extLst>
               <a:ext uri="{FF2B5EF4-FFF2-40B4-BE49-F238E27FC236}">
-                <a16:creationId xmlns:a16="http://schemas.microsoft.com/office/drawing/2014/main" id="{490E0A6D-5595-428E-99FF-84C3E85E0E13}"/>
+                <a16:creationId xmlns:a16="http://schemas.microsoft.com/office/drawing/2014/main" id="{CE01F140-410F-40D0-B783-B4664ACD1ACC}"/>
               </a:ext>
             </a:extLst>
           </p:cNvPr>
-          <p:cNvSpPr>
-            <a:spLocks noGrp="1"/>
-          </p:cNvSpPr>
-          <p:nvPr>
-            <p:ph idx="1"/>
-          </p:nvPr>
-        </p:nvSpPr>
-        <p:spPr/>
-        <p:txBody>
-          <a:bodyPr/>
-          <a:lstStyle/>
-          <a:p>
-            <a:r>
-              <a:rPr lang="fr-FR" dirty="0"/>
-              <a:t>La balise </a:t>
-            </a:r>
-            <a:r>
-              <a:rPr lang="fr-FR" dirty="0" err="1"/>
-              <a:t>title</a:t>
-            </a:r>
-            <a:r>
-              <a:rPr lang="fr-FR" dirty="0"/>
-              <a:t> est l’une des balises les plus importantes pour Google car elle sert à définir le sujet / but principal de la page. Un point n’est pas explicite. Le </a:t>
-            </a:r>
-            <a:r>
-              <a:rPr lang="fr-FR" dirty="0" err="1"/>
-              <a:t>title</a:t>
-            </a:r>
-            <a:r>
-              <a:rPr lang="fr-FR" dirty="0"/>
-              <a:t> sera d’ailleurs aussi affiché sur les résultats de recherches de Google, il faut donc que les utilisateurs aussi comprennent le but de la page pour cliquer.</a:t>
-            </a:r>
-          </a:p>
-        </p:txBody>
-      </p:sp>
+          <p:cNvPicPr>
+            <a:picLocks noChangeAspect="1"/>
+          </p:cNvPicPr>
+          <p:nvPr/>
+        </p:nvPicPr>
+        <p:blipFill>
+          <a:blip r:embed="rId2">
+            <a:extLst>
+              <a:ext uri="{28A0092B-C50C-407E-A947-70E740481C1C}">
+                <a14:useLocalDpi xmlns:a14="http://schemas.microsoft.com/office/drawing/2010/main" val="0"/>
+              </a:ext>
+            </a:extLst>
+          </a:blip>
+          <a:stretch>
+            <a:fillRect/>
+          </a:stretch>
+        </p:blipFill>
+        <p:spPr>
+          <a:xfrm>
+            <a:off x="4597758" y="1853754"/>
+            <a:ext cx="5717216" cy="4702611"/>
+          </a:xfrm>
+          <a:prstGeom prst="rect">
+            <a:avLst/>
+          </a:prstGeom>
+        </p:spPr>
+      </p:pic>
     </p:spTree>
     <p:extLst>
       <p:ext uri="{BB962C8B-B14F-4D97-AF65-F5344CB8AC3E}">
-        <p14:creationId xmlns:p14="http://schemas.microsoft.com/office/powerpoint/2010/main" val="1889303693"/>
+        <p14:creationId xmlns:p14="http://schemas.microsoft.com/office/powerpoint/2010/main" val="1037604998"/>
       </p:ext>
     </p:extLst>
   </p:cSld>
@@ -3892,7 +3937,7 @@
           <p:cNvPr id="2" name="Titre 1">
             <a:extLst>
               <a:ext uri="{FF2B5EF4-FFF2-40B4-BE49-F238E27FC236}">
-                <a16:creationId xmlns:a16="http://schemas.microsoft.com/office/drawing/2014/main" id="{47EA7F8F-07F8-43C0-97E2-E65BFEF9F59F}"/>
+                <a16:creationId xmlns:a16="http://schemas.microsoft.com/office/drawing/2014/main" id="{BF031587-D02C-4251-80B5-A94A39F768B8}"/>
               </a:ext>
             </a:extLst>
           </p:cNvPr>
@@ -3910,8 +3955,13 @@
           <a:p>
             <a:r>
               <a:rPr lang="fr-FR" dirty="0"/>
-              <a:t>3-Textes sous forme d’image</a:t>
-            </a:r>
+              <a:t>Mesure de performance sur </a:t>
+            </a:r>
+            <a:r>
+              <a:rPr lang="fr-FR" dirty="0" err="1"/>
+              <a:t>uptrends</a:t>
+            </a:r>
+            <a:endParaRPr lang="fr-FR" dirty="0"/>
           </a:p>
         </p:txBody>
       </p:sp>
@@ -3920,7 +3970,7 @@
           <p:cNvPr id="3" name="Espace réservé du contenu 2">
             <a:extLst>
               <a:ext uri="{FF2B5EF4-FFF2-40B4-BE49-F238E27FC236}">
-                <a16:creationId xmlns:a16="http://schemas.microsoft.com/office/drawing/2014/main" id="{992E6C39-BF46-4688-9AD8-6F11465FC4E0}"/>
+                <a16:creationId xmlns:a16="http://schemas.microsoft.com/office/drawing/2014/main" id="{A5D22B93-D611-4F7A-8D35-EBC4FBE2028D}"/>
               </a:ext>
             </a:extLst>
           </p:cNvPr>
@@ -3937,16 +3987,84 @@
           <a:lstStyle/>
           <a:p>
             <a:r>
+              <a:rPr lang="fr-FR" dirty="0" err="1"/>
+              <a:t>Après_amélioration</a:t>
+            </a:r>
+            <a:endParaRPr lang="fr-FR" dirty="0"/>
+          </a:p>
+          <a:p>
+            <a:pPr lvl="1"/>
+            <a:r>
+              <a:rPr lang="fr-FR" dirty="0" err="1"/>
+              <a:t>La_chouette_agence</a:t>
+            </a:r>
+            <a:endParaRPr lang="fr-FR" dirty="0"/>
+          </a:p>
+          <a:p>
+            <a:pPr lvl="2"/>
+            <a:r>
+              <a:rPr lang="fr-FR" dirty="0" err="1"/>
+              <a:t>Version_mobile</a:t>
+            </a:r>
+            <a:endParaRPr lang="fr-FR" dirty="0"/>
+          </a:p>
+          <a:p>
+            <a:pPr lvl="3"/>
+            <a:r>
               <a:rPr lang="fr-FR" dirty="0"/>
-              <a:t>Certaines phrases dans la page sont implémentées sous forme d’image. Ca augmente le temps de chargement de la page car les images sont plus lourdes que le texte brut, et ça impacte donc le SEO car le temps de chargement de la page est un critère important pour Google. En plus, les images sont moins pratiques pour adapter le texte sur petits écrans (responsive). De plus, les lecteurs d’écran ne pourront pas lire le texte dans l’image pour les malvoyants. Enfin,  au format texte, on pourra inclure des mots clés pertinents qui ne seront pas reconnus par Google au format image.</a:t>
-            </a:r>
-          </a:p>
-        </p:txBody>
-      </p:sp>
+              <a:t>accueil</a:t>
+            </a:r>
+          </a:p>
+          <a:p>
+            <a:pPr lvl="3"/>
+            <a:endParaRPr lang="fr-FR" dirty="0"/>
+          </a:p>
+          <a:p>
+            <a:pPr lvl="1"/>
+            <a:endParaRPr lang="fr-FR" dirty="0"/>
+          </a:p>
+        </p:txBody>
+      </p:sp>
+      <p:pic>
+        <p:nvPicPr>
+          <p:cNvPr id="5" name="Image 4">
+            <a:extLst>
+              <a:ext uri="{FF2B5EF4-FFF2-40B4-BE49-F238E27FC236}">
+                <a16:creationId xmlns:a16="http://schemas.microsoft.com/office/drawing/2014/main" id="{59F5243E-AEA9-4A92-9A02-BA7968EC2D34}"/>
+              </a:ext>
+            </a:extLst>
+          </p:cNvPr>
+          <p:cNvPicPr>
+            <a:picLocks noChangeAspect="1"/>
+          </p:cNvPicPr>
+          <p:nvPr/>
+        </p:nvPicPr>
+        <p:blipFill>
+          <a:blip r:embed="rId2">
+            <a:extLst>
+              <a:ext uri="{28A0092B-C50C-407E-A947-70E740481C1C}">
+                <a14:useLocalDpi xmlns:a14="http://schemas.microsoft.com/office/drawing/2010/main" val="0"/>
+              </a:ext>
+            </a:extLst>
+          </a:blip>
+          <a:stretch>
+            <a:fillRect/>
+          </a:stretch>
+        </p:blipFill>
+        <p:spPr>
+          <a:xfrm>
+            <a:off x="4855336" y="1853754"/>
+            <a:ext cx="6626322" cy="4870393"/>
+          </a:xfrm>
+          <a:prstGeom prst="rect">
+            <a:avLst/>
+          </a:prstGeom>
+        </p:spPr>
+      </p:pic>
     </p:spTree>
     <p:extLst>
       <p:ext uri="{BB962C8B-B14F-4D97-AF65-F5344CB8AC3E}">
-        <p14:creationId xmlns:p14="http://schemas.microsoft.com/office/powerpoint/2010/main" val="434277876"/>
+        <p14:creationId xmlns:p14="http://schemas.microsoft.com/office/powerpoint/2010/main" val="3015816548"/>
       </p:ext>
     </p:extLst>
   </p:cSld>
@@ -3978,7 +4096,7 @@
           <p:cNvPr id="2" name="Titre 1">
             <a:extLst>
               <a:ext uri="{FF2B5EF4-FFF2-40B4-BE49-F238E27FC236}">
-                <a16:creationId xmlns:a16="http://schemas.microsoft.com/office/drawing/2014/main" id="{101ABBF6-8598-4596-9587-67E9A0B69AB7}"/>
+                <a16:creationId xmlns:a16="http://schemas.microsoft.com/office/drawing/2014/main" id="{2EA697B4-099F-487C-8551-C1AEA852BC8B}"/>
               </a:ext>
             </a:extLst>
           </p:cNvPr>
@@ -3996,8 +4114,13 @@
           <a:p>
             <a:r>
               <a:rPr lang="fr-FR" dirty="0"/>
-              <a:t>4-name="description" content=""</a:t>
-            </a:r>
+              <a:t>Mesure de performance sur </a:t>
+            </a:r>
+            <a:r>
+              <a:rPr lang="fr-FR" dirty="0" err="1"/>
+              <a:t>uptrends</a:t>
+            </a:r>
+            <a:endParaRPr lang="fr-FR" dirty="0"/>
           </a:p>
         </p:txBody>
       </p:sp>
@@ -4006,7 +4129,7 @@
           <p:cNvPr id="3" name="Espace réservé du contenu 2">
             <a:extLst>
               <a:ext uri="{FF2B5EF4-FFF2-40B4-BE49-F238E27FC236}">
-                <a16:creationId xmlns:a16="http://schemas.microsoft.com/office/drawing/2014/main" id="{2818D3C8-A90F-4E57-A8FF-9D638B52D22F}"/>
+                <a16:creationId xmlns:a16="http://schemas.microsoft.com/office/drawing/2014/main" id="{CA91EB9F-A6C6-4853-9AE4-F7C1EEAED637}"/>
               </a:ext>
             </a:extLst>
           </p:cNvPr>
@@ -4023,32 +4146,76 @@
           <a:lstStyle/>
           <a:p>
             <a:r>
+              <a:rPr lang="fr-FR" dirty="0" err="1"/>
+              <a:t>Avant_amélioration</a:t>
+            </a:r>
+            <a:endParaRPr lang="fr-FR" dirty="0"/>
+          </a:p>
+          <a:p>
+            <a:pPr lvl="1"/>
+            <a:r>
+              <a:rPr lang="fr-FR" dirty="0" err="1"/>
+              <a:t>Starter_web_site</a:t>
+            </a:r>
+            <a:endParaRPr lang="fr-FR" dirty="0"/>
+          </a:p>
+          <a:p>
+            <a:pPr lvl="2"/>
+            <a:r>
+              <a:rPr lang="fr-FR" dirty="0" err="1"/>
+              <a:t>Version_mobile</a:t>
+            </a:r>
+            <a:endParaRPr lang="fr-FR" dirty="0"/>
+          </a:p>
+          <a:p>
+            <a:pPr lvl="3"/>
+            <a:r>
               <a:rPr lang="fr-FR" dirty="0"/>
-              <a:t>La balise description est presque aussi importante que la balise </a:t>
-            </a:r>
-            <a:r>
-              <a:rPr lang="fr-FR" dirty="0" err="1"/>
-              <a:t>title</a:t>
-            </a:r>
-            <a:r>
-              <a:rPr lang="fr-FR" dirty="0"/>
-              <a:t>. Les mots clés à l’intérieur aident Google à savoir de quoi parle la page, et c’est aussi ce qui est affiché sous le </a:t>
-            </a:r>
-            <a:r>
-              <a:rPr lang="fr-FR" dirty="0" err="1"/>
-              <a:t>title</a:t>
-            </a:r>
-            <a:r>
-              <a:rPr lang="fr-FR" dirty="0"/>
-              <a:t> dans les résultats de recherche, c’est donc aussi utile pour vos visiteurs.</a:t>
-            </a:r>
-          </a:p>
-        </p:txBody>
-      </p:sp>
+              <a:t>Page_2</a:t>
+            </a:r>
+          </a:p>
+        </p:txBody>
+      </p:sp>
+      <p:pic>
+        <p:nvPicPr>
+          <p:cNvPr id="5" name="Image 4">
+            <a:extLst>
+              <a:ext uri="{FF2B5EF4-FFF2-40B4-BE49-F238E27FC236}">
+                <a16:creationId xmlns:a16="http://schemas.microsoft.com/office/drawing/2014/main" id="{CEF565DE-87BA-4860-86B7-9FD7B1AEE326}"/>
+              </a:ext>
+            </a:extLst>
+          </p:cNvPr>
+          <p:cNvPicPr>
+            <a:picLocks noChangeAspect="1"/>
+          </p:cNvPicPr>
+          <p:nvPr/>
+        </p:nvPicPr>
+        <p:blipFill>
+          <a:blip r:embed="rId2">
+            <a:extLst>
+              <a:ext uri="{28A0092B-C50C-407E-A947-70E740481C1C}">
+                <a14:useLocalDpi xmlns:a14="http://schemas.microsoft.com/office/drawing/2010/main" val="0"/>
+              </a:ext>
+            </a:extLst>
+          </a:blip>
+          <a:stretch>
+            <a:fillRect/>
+          </a:stretch>
+        </p:blipFill>
+        <p:spPr>
+          <a:xfrm>
+            <a:off x="4340180" y="1853754"/>
+            <a:ext cx="6081708" cy="4509152"/>
+          </a:xfrm>
+          <a:prstGeom prst="rect">
+            <a:avLst/>
+          </a:prstGeom>
+        </p:spPr>
+      </p:pic>
     </p:spTree>
     <p:extLst>
       <p:ext uri="{BB962C8B-B14F-4D97-AF65-F5344CB8AC3E}">
-        <p14:creationId xmlns:p14="http://schemas.microsoft.com/office/powerpoint/2010/main" val="2442860782"/>
+        <p14:creationId xmlns:p14="http://schemas.microsoft.com/office/powerpoint/2010/main" val="4286921044"/>
       </p:ext>
     </p:extLst>
   </p:cSld>
@@ -4080,7 +4247,7 @@
           <p:cNvPr id="2" name="Titre 1">
             <a:extLst>
               <a:ext uri="{FF2B5EF4-FFF2-40B4-BE49-F238E27FC236}">
-                <a16:creationId xmlns:a16="http://schemas.microsoft.com/office/drawing/2014/main" id="{E071402D-725B-4167-84CF-36D5371B96EC}"/>
+                <a16:creationId xmlns:a16="http://schemas.microsoft.com/office/drawing/2014/main" id="{BFF28EC9-F7DD-4250-9326-31EFC7F55D4F}"/>
               </a:ext>
             </a:extLst>
           </p:cNvPr>
@@ -4098,8 +4265,13 @@
           <a:p>
             <a:r>
               <a:rPr lang="fr-FR" dirty="0"/>
-              <a:t>5-Pas de balises sémantiques</a:t>
-            </a:r>
+              <a:t>Mesure de performance sur </a:t>
+            </a:r>
+            <a:r>
+              <a:rPr lang="fr-FR" dirty="0" err="1"/>
+              <a:t>uptrends</a:t>
+            </a:r>
+            <a:endParaRPr lang="fr-FR" dirty="0"/>
           </a:p>
         </p:txBody>
       </p:sp>
@@ -4108,7 +4280,7 @@
           <p:cNvPr id="3" name="Espace réservé du contenu 2">
             <a:extLst>
               <a:ext uri="{FF2B5EF4-FFF2-40B4-BE49-F238E27FC236}">
-                <a16:creationId xmlns:a16="http://schemas.microsoft.com/office/drawing/2014/main" id="{77B67AB7-B559-4099-8262-D9424AF43D58}"/>
+                <a16:creationId xmlns:a16="http://schemas.microsoft.com/office/drawing/2014/main" id="{0F909770-3085-416B-8B43-EBAC0D04863C}"/>
               </a:ext>
             </a:extLst>
           </p:cNvPr>
@@ -4125,16 +4297,81 @@
           <a:lstStyle/>
           <a:p>
             <a:r>
-              <a:rPr lang="fr-FR" dirty="0"/>
-              <a:t>Les balises sémantiques permettent une meilleure accessibilité des contenus pour les personnes nécessitant des logiciels de lecture de site pour consulter le web.</a:t>
-            </a:r>
-          </a:p>
-        </p:txBody>
-      </p:sp>
+              <a:rPr lang="fr-FR" dirty="0" err="1"/>
+              <a:t>Après_amélioration</a:t>
+            </a:r>
+            <a:endParaRPr lang="fr-FR" dirty="0"/>
+          </a:p>
+          <a:p>
+            <a:pPr lvl="1"/>
+            <a:r>
+              <a:rPr lang="fr-FR" dirty="0" err="1"/>
+              <a:t>La_chouette_agence</a:t>
+            </a:r>
+            <a:endParaRPr lang="fr-FR" dirty="0"/>
+          </a:p>
+          <a:p>
+            <a:pPr lvl="2"/>
+            <a:r>
+              <a:rPr lang="fr-FR" dirty="0" err="1"/>
+              <a:t>Version_mobile</a:t>
+            </a:r>
+            <a:endParaRPr lang="fr-FR" dirty="0"/>
+          </a:p>
+          <a:p>
+            <a:pPr lvl="3"/>
+            <a:r>
+              <a:rPr lang="fr-FR" dirty="0" err="1"/>
+              <a:t>Page_contact</a:t>
+            </a:r>
+            <a:endParaRPr lang="fr-FR" dirty="0"/>
+          </a:p>
+          <a:p>
+            <a:pPr lvl="2"/>
+            <a:endParaRPr lang="fr-FR" dirty="0"/>
+          </a:p>
+        </p:txBody>
+      </p:sp>
+      <p:pic>
+        <p:nvPicPr>
+          <p:cNvPr id="5" name="Image 4">
+            <a:extLst>
+              <a:ext uri="{FF2B5EF4-FFF2-40B4-BE49-F238E27FC236}">
+                <a16:creationId xmlns:a16="http://schemas.microsoft.com/office/drawing/2014/main" id="{5A26CFD6-36BE-4651-92E4-91FB75AEBFBB}"/>
+              </a:ext>
+            </a:extLst>
+          </p:cNvPr>
+          <p:cNvPicPr>
+            <a:picLocks noChangeAspect="1"/>
+          </p:cNvPicPr>
+          <p:nvPr/>
+        </p:nvPicPr>
+        <p:blipFill>
+          <a:blip r:embed="rId2">
+            <a:extLst>
+              <a:ext uri="{28A0092B-C50C-407E-A947-70E740481C1C}">
+                <a14:useLocalDpi xmlns:a14="http://schemas.microsoft.com/office/drawing/2010/main" val="0"/>
+              </a:ext>
+            </a:extLst>
+          </a:blip>
+          <a:stretch>
+            <a:fillRect/>
+          </a:stretch>
+        </p:blipFill>
+        <p:spPr>
+          <a:xfrm>
+            <a:off x="5009881" y="1853754"/>
+            <a:ext cx="6585396" cy="4814926"/>
+          </a:xfrm>
+          <a:prstGeom prst="rect">
+            <a:avLst/>
+          </a:prstGeom>
+        </p:spPr>
+      </p:pic>
     </p:spTree>
     <p:extLst>
       <p:ext uri="{BB962C8B-B14F-4D97-AF65-F5344CB8AC3E}">
-        <p14:creationId xmlns:p14="http://schemas.microsoft.com/office/powerpoint/2010/main" val="2554116559"/>
+        <p14:creationId xmlns:p14="http://schemas.microsoft.com/office/powerpoint/2010/main" val="3262151693"/>
       </p:ext>
     </p:extLst>
   </p:cSld>
@@ -4166,7 +4403,7 @@
           <p:cNvPr id="2" name="Titre 1">
             <a:extLst>
               <a:ext uri="{FF2B5EF4-FFF2-40B4-BE49-F238E27FC236}">
-                <a16:creationId xmlns:a16="http://schemas.microsoft.com/office/drawing/2014/main" id="{F9D44077-2EF9-4EC8-8AC7-5F2BF9EC611F}"/>
+                <a16:creationId xmlns:a16="http://schemas.microsoft.com/office/drawing/2014/main" id="{B3E740AE-23E4-4595-A25D-10A297ADD273}"/>
               </a:ext>
             </a:extLst>
           </p:cNvPr>
@@ -4177,50 +4414,134 @@
             <p:ph type="title"/>
           </p:nvPr>
         </p:nvSpPr>
-        <p:spPr/>
+        <p:spPr>
+          <a:xfrm>
+            <a:off x="1438701" y="825111"/>
+            <a:ext cx="9603275" cy="1049235"/>
+          </a:xfrm>
+        </p:spPr>
         <p:txBody>
           <a:bodyPr/>
           <a:lstStyle/>
           <a:p>
             <a:r>
               <a:rPr lang="fr-FR" dirty="0"/>
-              <a:t>6-Textes sous forme d’image</a:t>
-            </a:r>
-          </a:p>
-        </p:txBody>
-      </p:sp>
-      <p:sp>
-        <p:nvSpPr>
-          <p:cNvPr id="3" name="Espace réservé du contenu 2">
+              <a:t>Mesure de performance sur </a:t>
+            </a:r>
+            <a:r>
+              <a:rPr lang="fr-FR" dirty="0" err="1"/>
+              <a:t>wave</a:t>
+            </a:r>
+            <a:endParaRPr lang="fr-FR" dirty="0"/>
+          </a:p>
+        </p:txBody>
+      </p:sp>
+      <p:pic>
+        <p:nvPicPr>
+          <p:cNvPr id="5" name="Espace réservé du contenu 4">
             <a:extLst>
               <a:ext uri="{FF2B5EF4-FFF2-40B4-BE49-F238E27FC236}">
-                <a16:creationId xmlns:a16="http://schemas.microsoft.com/office/drawing/2014/main" id="{351189DE-4427-4C60-896A-8E0351FB23DE}"/>
+                <a16:creationId xmlns:a16="http://schemas.microsoft.com/office/drawing/2014/main" id="{B30E8BC4-81A8-44F0-95D9-182D3662A8E4}"/>
               </a:ext>
             </a:extLst>
           </p:cNvPr>
-          <p:cNvSpPr>
-            <a:spLocks noGrp="1"/>
-          </p:cNvSpPr>
+          <p:cNvPicPr>
+            <a:picLocks noGrp="1" noChangeAspect="1"/>
+          </p:cNvPicPr>
           <p:nvPr>
             <p:ph idx="1"/>
           </p:nvPr>
-        </p:nvSpPr>
-        <p:spPr/>
-        <p:txBody>
-          <a:bodyPr/>
-          <a:lstStyle/>
+        </p:nvPicPr>
+        <p:blipFill>
+          <a:blip r:embed="rId2">
+            <a:extLst>
+              <a:ext uri="{28A0092B-C50C-407E-A947-70E740481C1C}">
+                <a14:useLocalDpi xmlns:a14="http://schemas.microsoft.com/office/drawing/2010/main" val="0"/>
+              </a:ext>
+            </a:extLst>
+          </a:blip>
+          <a:stretch>
+            <a:fillRect/>
+          </a:stretch>
+        </p:blipFill>
+        <p:spPr>
+          <a:xfrm>
+            <a:off x="4951938" y="1874346"/>
+            <a:ext cx="2288123" cy="4179135"/>
+          </a:xfrm>
+        </p:spPr>
+      </p:pic>
+      <p:sp>
+        <p:nvSpPr>
+          <p:cNvPr id="3" name="ZoneTexte 2">
+            <a:extLst>
+              <a:ext uri="{FF2B5EF4-FFF2-40B4-BE49-F238E27FC236}">
+                <a16:creationId xmlns:a16="http://schemas.microsoft.com/office/drawing/2014/main" id="{11F62209-91D5-4CD8-B970-9D859A13B15A}"/>
+              </a:ext>
+            </a:extLst>
+          </p:cNvPr>
+          <p:cNvSpPr txBox="1"/>
+          <p:nvPr/>
+        </p:nvSpPr>
+        <p:spPr>
+          <a:xfrm>
+            <a:off x="1438701" y="2305318"/>
+            <a:ext cx="2824206" cy="1477328"/>
+          </a:xfrm>
+          <a:prstGeom prst="rect">
+            <a:avLst/>
+          </a:prstGeom>
+          <a:noFill/>
+        </p:spPr>
+        <p:txBody>
+          <a:bodyPr wrap="square" rtlCol="0">
+            <a:spAutoFit/>
+          </a:bodyPr>
+          <a:lstStyle/>
+          <a:p>
+            <a:r>
+              <a:rPr lang="fr-FR" dirty="0" err="1"/>
+              <a:t>Avant_amélioration</a:t>
+            </a:r>
+            <a:endParaRPr lang="fr-FR" dirty="0"/>
+          </a:p>
           <a:p>
             <a:r>
               <a:rPr lang="fr-FR" dirty="0"/>
-              <a:t>Certaines phrases dans la page sont implémentés sous forme d’image. CA augmente le temps de chargement de la page car les images sont plus lourdes que le texte brute, et ça impacte donc le SEO car le temps de chargement de la page est un critère important pour Google. En plus, les images sont moins pratiques pour adapter le texte sur petits écrans (responsive). De plus, les lecteurs d’écran ne pourront pas lire le texte dans l’image pour les malvoyants. Enfin,  au format texte, on pourra inclure des mots clés pertinents qui ne seront pas reconnus par Google au format image.</a:t>
-            </a:r>
+              <a:t>	</a:t>
+            </a:r>
+          </a:p>
+          <a:p>
+            <a:r>
+              <a:rPr lang="fr-FR" dirty="0"/>
+              <a:t>	</a:t>
+            </a:r>
+            <a:r>
+              <a:rPr lang="fr-FR" dirty="0" err="1"/>
+              <a:t>starter_web_site</a:t>
+            </a:r>
+            <a:endParaRPr lang="fr-FR" dirty="0"/>
+          </a:p>
+          <a:p>
+            <a:endParaRPr lang="fr-FR" dirty="0"/>
+          </a:p>
+          <a:p>
+            <a:r>
+              <a:rPr lang="fr-FR" dirty="0"/>
+              <a:t>		</a:t>
+            </a:r>
+            <a:r>
+              <a:rPr lang="fr-FR" dirty="0" err="1"/>
+              <a:t>page_accueil</a:t>
+            </a:r>
+            <a:endParaRPr lang="fr-FR" dirty="0"/>
           </a:p>
         </p:txBody>
       </p:sp>
     </p:spTree>
     <p:extLst>
       <p:ext uri="{BB962C8B-B14F-4D97-AF65-F5344CB8AC3E}">
-        <p14:creationId xmlns:p14="http://schemas.microsoft.com/office/powerpoint/2010/main" val="1584401365"/>
+        <p14:creationId xmlns:p14="http://schemas.microsoft.com/office/powerpoint/2010/main" val="2995031672"/>
       </p:ext>
     </p:extLst>
   </p:cSld>
@@ -4252,7 +4573,7 @@
           <p:cNvPr id="2" name="Titre 1">
             <a:extLst>
               <a:ext uri="{FF2B5EF4-FFF2-40B4-BE49-F238E27FC236}">
-                <a16:creationId xmlns:a16="http://schemas.microsoft.com/office/drawing/2014/main" id="{5EA6563D-5AAA-4444-AA4B-99CA74C1A647}"/>
+                <a16:creationId xmlns:a16="http://schemas.microsoft.com/office/drawing/2014/main" id="{62F41970-888F-4B8E-8A4F-9B1D6AA228A9}"/>
               </a:ext>
             </a:extLst>
           </p:cNvPr>
@@ -4270,59 +4591,101 @@
           <a:p>
             <a:r>
               <a:rPr lang="fr-FR" dirty="0"/>
-              <a:t>7-&lt;</a:t>
+              <a:t>Mesure de performance sur </a:t>
             </a:r>
             <a:r>
               <a:rPr lang="fr-FR" dirty="0" err="1"/>
-              <a:t>meta</a:t>
-            </a:r>
-            <a:r>
-              <a:rPr lang="fr-FR" dirty="0"/>
-              <a:t> </a:t>
-            </a:r>
+              <a:t>wave</a:t>
+            </a:r>
+            <a:endParaRPr lang="fr-FR" dirty="0"/>
+          </a:p>
+        </p:txBody>
+      </p:sp>
+      <p:sp>
+        <p:nvSpPr>
+          <p:cNvPr id="3" name="Espace réservé du contenu 2">
+            <a:extLst>
+              <a:ext uri="{FF2B5EF4-FFF2-40B4-BE49-F238E27FC236}">
+                <a16:creationId xmlns:a16="http://schemas.microsoft.com/office/drawing/2014/main" id="{86320096-369F-4FCB-83F1-55CBCE7C83EC}"/>
+              </a:ext>
+            </a:extLst>
+          </p:cNvPr>
+          <p:cNvSpPr>
+            <a:spLocks noGrp="1"/>
+          </p:cNvSpPr>
+          <p:nvPr>
+            <p:ph idx="1"/>
+          </p:nvPr>
+        </p:nvSpPr>
+        <p:spPr/>
+        <p:txBody>
+          <a:bodyPr/>
+          <a:lstStyle/>
+          <a:p>
             <a:r>
               <a:rPr lang="fr-FR" dirty="0" err="1"/>
-              <a:t>name</a:t>
-            </a:r>
-            <a:r>
-              <a:rPr lang="fr-FR" dirty="0"/>
-              <a:t>="keywords" content="[...]"&gt;</a:t>
-            </a:r>
-          </a:p>
-        </p:txBody>
-      </p:sp>
-      <p:sp>
-        <p:nvSpPr>
-          <p:cNvPr id="3" name="Espace réservé du contenu 2">
+              <a:t>Après_amélioration</a:t>
+            </a:r>
+            <a:endParaRPr lang="fr-FR" dirty="0"/>
+          </a:p>
+          <a:p>
+            <a:pPr lvl="1"/>
+            <a:r>
+              <a:rPr lang="fr-FR" dirty="0" err="1"/>
+              <a:t>La_chouette_agence</a:t>
+            </a:r>
+            <a:endParaRPr lang="fr-FR" dirty="0"/>
+          </a:p>
+          <a:p>
+            <a:pPr lvl="2"/>
+            <a:r>
+              <a:rPr lang="fr-FR" dirty="0" err="1"/>
+              <a:t>Page_accueil</a:t>
+            </a:r>
+            <a:endParaRPr lang="fr-FR" dirty="0"/>
+          </a:p>
+        </p:txBody>
+      </p:sp>
+      <p:pic>
+        <p:nvPicPr>
+          <p:cNvPr id="5" name="Image 4">
             <a:extLst>
               <a:ext uri="{FF2B5EF4-FFF2-40B4-BE49-F238E27FC236}">
-                <a16:creationId xmlns:a16="http://schemas.microsoft.com/office/drawing/2014/main" id="{087799E5-AA99-4EB5-8A44-D8E0C1F5AC27}"/>
+                <a16:creationId xmlns:a16="http://schemas.microsoft.com/office/drawing/2014/main" id="{3D2D3766-7245-4CE1-933B-00D284C2D190}"/>
               </a:ext>
             </a:extLst>
           </p:cNvPr>
-          <p:cNvSpPr>
-            <a:spLocks noGrp="1"/>
-          </p:cNvSpPr>
-          <p:nvPr>
-            <p:ph idx="1"/>
-          </p:nvPr>
-        </p:nvSpPr>
-        <p:spPr/>
-        <p:txBody>
-          <a:bodyPr/>
-          <a:lstStyle/>
-          <a:p>
-            <a:r>
-              <a:rPr lang="fr-FR" dirty="0"/>
-              <a:t>La balise Keywords est dépréciée aujourd’hui. Au mieux elle n’est pas prise en compte, au pire cela peut-être sanctionné si il y a trop de mots clés dans la balise.</a:t>
-            </a:r>
-          </a:p>
-        </p:txBody>
-      </p:sp>
+          <p:cNvPicPr>
+            <a:picLocks noChangeAspect="1"/>
+          </p:cNvPicPr>
+          <p:nvPr/>
+        </p:nvPicPr>
+        <p:blipFill>
+          <a:blip r:embed="rId2">
+            <a:extLst>
+              <a:ext uri="{28A0092B-C50C-407E-A947-70E740481C1C}">
+                <a14:useLocalDpi xmlns:a14="http://schemas.microsoft.com/office/drawing/2010/main" val="0"/>
+              </a:ext>
+            </a:extLst>
+          </a:blip>
+          <a:stretch>
+            <a:fillRect/>
+          </a:stretch>
+        </p:blipFill>
+        <p:spPr>
+          <a:xfrm>
+            <a:off x="4919134" y="1867229"/>
+            <a:ext cx="2272598" cy="4159593"/>
+          </a:xfrm>
+          <a:prstGeom prst="rect">
+            <a:avLst/>
+          </a:prstGeom>
+        </p:spPr>
+      </p:pic>
     </p:spTree>
     <p:extLst>
       <p:ext uri="{BB962C8B-B14F-4D97-AF65-F5344CB8AC3E}">
-        <p14:creationId xmlns:p14="http://schemas.microsoft.com/office/powerpoint/2010/main" val="3584817504"/>
+        <p14:creationId xmlns:p14="http://schemas.microsoft.com/office/powerpoint/2010/main" val="3568261620"/>
       </p:ext>
     </p:extLst>
   </p:cSld>
@@ -4354,7 +4717,7 @@
           <p:cNvPr id="2" name="Titre 1">
             <a:extLst>
               <a:ext uri="{FF2B5EF4-FFF2-40B4-BE49-F238E27FC236}">
-                <a16:creationId xmlns:a16="http://schemas.microsoft.com/office/drawing/2014/main" id="{8BD9F299-88A2-464C-B7BE-0D78EBBAC5A1}"/>
+                <a16:creationId xmlns:a16="http://schemas.microsoft.com/office/drawing/2014/main" id="{B07AC2AC-0595-4DCC-A067-CC3378C02543}"/>
               </a:ext>
             </a:extLst>
           </p:cNvPr>
@@ -4372,8 +4735,13 @@
           <a:p>
             <a:r>
               <a:rPr lang="fr-FR" dirty="0"/>
-              <a:t>8-Le nom de la page de contact</a:t>
-            </a:r>
+              <a:t>Mesure de performance sur </a:t>
+            </a:r>
+            <a:r>
+              <a:rPr lang="fr-FR" dirty="0" err="1"/>
+              <a:t>wave</a:t>
+            </a:r>
+            <a:endParaRPr lang="fr-FR" dirty="0"/>
           </a:p>
         </p:txBody>
       </p:sp>
@@ -4382,7 +4750,7 @@
           <p:cNvPr id="3" name="Espace réservé du contenu 2">
             <a:extLst>
               <a:ext uri="{FF2B5EF4-FFF2-40B4-BE49-F238E27FC236}">
-                <a16:creationId xmlns:a16="http://schemas.microsoft.com/office/drawing/2014/main" id="{ED69E767-A1CB-4D6C-A315-C8D7249555CE}"/>
+                <a16:creationId xmlns:a16="http://schemas.microsoft.com/office/drawing/2014/main" id="{93671696-C3A1-4C9B-BAEF-9E30D8C61EF3}"/>
               </a:ext>
             </a:extLst>
           </p:cNvPr>
@@ -4399,22 +4767,68 @@
           <a:lstStyle/>
           <a:p>
             <a:r>
+              <a:rPr lang="fr-FR" dirty="0" err="1"/>
+              <a:t>Avant_amélioration</a:t>
+            </a:r>
+            <a:endParaRPr lang="fr-FR" dirty="0"/>
+          </a:p>
+          <a:p>
+            <a:pPr lvl="1"/>
+            <a:r>
+              <a:rPr lang="fr-FR" dirty="0" err="1"/>
+              <a:t>Starter_web_site</a:t>
+            </a:r>
+            <a:endParaRPr lang="fr-FR" dirty="0"/>
+          </a:p>
+          <a:p>
+            <a:pPr lvl="2"/>
+            <a:r>
               <a:rPr lang="fr-FR" dirty="0"/>
-              <a:t>Le nom de la page de contact est « page2 ». Ce n’est pas explicite ni pour Google ni pour les visiteurs.</a:t>
-            </a:r>
-          </a:p>
-          <a:p>
-            <a:r>
-              <a:rPr lang="fr-FR" dirty="0"/>
-              <a:t>Elle a été remplacée par:  « contact »</a:t>
-            </a:r>
-          </a:p>
-        </p:txBody>
-      </p:sp>
+              <a:t>Page_2</a:t>
+            </a:r>
+          </a:p>
+        </p:txBody>
+      </p:sp>
+      <p:pic>
+        <p:nvPicPr>
+          <p:cNvPr id="5" name="Image 4">
+            <a:extLst>
+              <a:ext uri="{FF2B5EF4-FFF2-40B4-BE49-F238E27FC236}">
+                <a16:creationId xmlns:a16="http://schemas.microsoft.com/office/drawing/2014/main" id="{2095F803-1A86-4EC8-B694-653A679659B1}"/>
+              </a:ext>
+            </a:extLst>
+          </p:cNvPr>
+          <p:cNvPicPr>
+            <a:picLocks noChangeAspect="1"/>
+          </p:cNvPicPr>
+          <p:nvPr/>
+        </p:nvPicPr>
+        <p:blipFill>
+          <a:blip r:embed="rId2">
+            <a:extLst>
+              <a:ext uri="{28A0092B-C50C-407E-A947-70E740481C1C}">
+                <a14:useLocalDpi xmlns:a14="http://schemas.microsoft.com/office/drawing/2010/main" val="0"/>
+              </a:ext>
+            </a:extLst>
+          </a:blip>
+          <a:stretch>
+            <a:fillRect/>
+          </a:stretch>
+        </p:blipFill>
+        <p:spPr>
+          <a:xfrm>
+            <a:off x="5267459" y="1874553"/>
+            <a:ext cx="2765940" cy="4694819"/>
+          </a:xfrm>
+          <a:prstGeom prst="rect">
+            <a:avLst/>
+          </a:prstGeom>
+        </p:spPr>
+      </p:pic>
     </p:spTree>
     <p:extLst>
       <p:ext uri="{BB962C8B-B14F-4D97-AF65-F5344CB8AC3E}">
-        <p14:creationId xmlns:p14="http://schemas.microsoft.com/office/powerpoint/2010/main" val="1949017567"/>
+        <p14:creationId xmlns:p14="http://schemas.microsoft.com/office/powerpoint/2010/main" val="2424044934"/>
       </p:ext>
     </p:extLst>
   </p:cSld>
@@ -4446,7 +4860,7 @@
           <p:cNvPr id="2" name="Titre 1">
             <a:extLst>
               <a:ext uri="{FF2B5EF4-FFF2-40B4-BE49-F238E27FC236}">
-                <a16:creationId xmlns:a16="http://schemas.microsoft.com/office/drawing/2014/main" id="{F01415BB-62D8-4B37-AEFE-96476F58EE1F}"/>
+                <a16:creationId xmlns:a16="http://schemas.microsoft.com/office/drawing/2014/main" id="{897F39C8-A49B-4F29-A509-1E3E679D5834}"/>
               </a:ext>
             </a:extLst>
           </p:cNvPr>
@@ -4464,16 +4878,13 @@
           <a:p>
             <a:r>
               <a:rPr lang="fr-FR" dirty="0"/>
-              <a:t>9-Technique </a:t>
+              <a:t>Mesure de performance sur </a:t>
             </a:r>
             <a:r>
               <a:rPr lang="fr-FR" dirty="0" err="1"/>
-              <a:t>blackhat</a:t>
-            </a:r>
-            <a:r>
-              <a:rPr lang="fr-FR" dirty="0"/>
-              <a:t> : mots clés en petit sur fond blanc</a:t>
-            </a:r>
+              <a:t>wave</a:t>
+            </a:r>
+            <a:endParaRPr lang="fr-FR" dirty="0"/>
           </a:p>
         </p:txBody>
       </p:sp>
@@ -4482,7 +4893,7 @@
           <p:cNvPr id="3" name="Espace réservé du contenu 2">
             <a:extLst>
               <a:ext uri="{FF2B5EF4-FFF2-40B4-BE49-F238E27FC236}">
-                <a16:creationId xmlns:a16="http://schemas.microsoft.com/office/drawing/2014/main" id="{FF95F175-EDEE-4D94-9FD8-CC1C1D10F19F}"/>
+                <a16:creationId xmlns:a16="http://schemas.microsoft.com/office/drawing/2014/main" id="{679E7D10-97ED-4658-8469-7DD3339F432B}"/>
               </a:ext>
             </a:extLst>
           </p:cNvPr>
@@ -4499,16 +4910,73 @@
           <a:lstStyle/>
           <a:p>
             <a:r>
-              <a:rPr lang="fr-FR" dirty="0"/>
-              <a:t>La div avec la classe « keywords » contient une succession de mots clés sans contexte, il s’agit d’une technique malicieuse pour booster artificiellement son référencement mais Google peut détecter les plus grossières dont celle-ci. En plus de rien rapporter, Google attribuera un malus à votre page qu’il sera difficile à faire enlever.</a:t>
-            </a:r>
-          </a:p>
-        </p:txBody>
-      </p:sp>
+              <a:rPr lang="fr-FR" dirty="0" err="1"/>
+              <a:t>Après_amélioration</a:t>
+            </a:r>
+            <a:endParaRPr lang="fr-FR" dirty="0"/>
+          </a:p>
+          <a:p>
+            <a:pPr lvl="1"/>
+            <a:r>
+              <a:rPr lang="fr-FR" dirty="0" err="1"/>
+              <a:t>La_chouette_agence</a:t>
+            </a:r>
+            <a:endParaRPr lang="fr-FR" dirty="0"/>
+          </a:p>
+          <a:p>
+            <a:pPr lvl="2"/>
+            <a:r>
+              <a:rPr lang="fr-FR" dirty="0" err="1"/>
+              <a:t>Page_contact</a:t>
+            </a:r>
+            <a:endParaRPr lang="fr-FR" dirty="0"/>
+          </a:p>
+          <a:p>
+            <a:pPr lvl="1"/>
+            <a:endParaRPr lang="fr-FR" dirty="0"/>
+          </a:p>
+        </p:txBody>
+      </p:sp>
+      <p:pic>
+        <p:nvPicPr>
+          <p:cNvPr id="5" name="Image 4">
+            <a:extLst>
+              <a:ext uri="{FF2B5EF4-FFF2-40B4-BE49-F238E27FC236}">
+                <a16:creationId xmlns:a16="http://schemas.microsoft.com/office/drawing/2014/main" id="{ACD78B8C-5467-4DC1-9AF0-CC2015DE2FD5}"/>
+              </a:ext>
+            </a:extLst>
+          </p:cNvPr>
+          <p:cNvPicPr>
+            <a:picLocks noChangeAspect="1"/>
+          </p:cNvPicPr>
+          <p:nvPr/>
+        </p:nvPicPr>
+        <p:blipFill>
+          <a:blip r:embed="rId2">
+            <a:extLst>
+              <a:ext uri="{28A0092B-C50C-407E-A947-70E740481C1C}">
+                <a14:useLocalDpi xmlns:a14="http://schemas.microsoft.com/office/drawing/2010/main" val="0"/>
+              </a:ext>
+            </a:extLst>
+          </a:blip>
+          <a:stretch>
+            <a:fillRect/>
+          </a:stretch>
+        </p:blipFill>
+        <p:spPr>
+          <a:xfrm>
+            <a:off x="5434885" y="1931228"/>
+            <a:ext cx="2631856" cy="4789809"/>
+          </a:xfrm>
+          <a:prstGeom prst="rect">
+            <a:avLst/>
+          </a:prstGeom>
+        </p:spPr>
+      </p:pic>
     </p:spTree>
     <p:extLst>
       <p:ext uri="{BB962C8B-B14F-4D97-AF65-F5344CB8AC3E}">
-        <p14:creationId xmlns:p14="http://schemas.microsoft.com/office/powerpoint/2010/main" val="1032213200"/>
+        <p14:creationId xmlns:p14="http://schemas.microsoft.com/office/powerpoint/2010/main" val="589436065"/>
       </p:ext>
     </p:extLst>
   </p:cSld>
@@ -4540,7 +5008,7 @@
           <p:cNvPr id="2" name="Titre 1">
             <a:extLst>
               <a:ext uri="{FF2B5EF4-FFF2-40B4-BE49-F238E27FC236}">
-                <a16:creationId xmlns:a16="http://schemas.microsoft.com/office/drawing/2014/main" id="{DC00E362-A1C5-47B9-826D-135F2E9F6ADF}"/>
+                <a16:creationId xmlns:a16="http://schemas.microsoft.com/office/drawing/2014/main" id="{CA27DFF1-3C88-4403-A7EA-BF8C05B82E3E}"/>
               </a:ext>
             </a:extLst>
           </p:cNvPr>
@@ -4551,42 +5019,20 @@
             <p:ph type="title"/>
           </p:nvPr>
         </p:nvSpPr>
-        <p:spPr/>
-        <p:txBody>
-          <a:bodyPr/>
-          <a:lstStyle/>
-          <a:p>
-            <a:r>
-              <a:rPr lang="fr-FR" dirty="0"/>
-              <a:t>10-Les balises alt sont parfois absentes ou alors mal complétées</a:t>
-            </a:r>
-          </a:p>
-        </p:txBody>
-      </p:sp>
-      <p:sp>
-        <p:nvSpPr>
-          <p:cNvPr id="3" name="Espace réservé du contenu 2">
-            <a:extLst>
-              <a:ext uri="{FF2B5EF4-FFF2-40B4-BE49-F238E27FC236}">
-                <a16:creationId xmlns:a16="http://schemas.microsoft.com/office/drawing/2014/main" id="{8E0C9BBE-66F0-4918-A3BE-B34F679FD4A4}"/>
-              </a:ext>
-            </a:extLst>
-          </p:cNvPr>
-          <p:cNvSpPr>
-            <a:spLocks noGrp="1"/>
-          </p:cNvSpPr>
-          <p:nvPr>
-            <p:ph idx="1"/>
-          </p:nvPr>
-        </p:nvSpPr>
-        <p:spPr/>
-        <p:txBody>
-          <a:bodyPr/>
-          <a:lstStyle/>
-          <a:p>
-            <a:r>
-              <a:rPr lang="fr-FR" dirty="0"/>
-              <a:t>La balises Alt est quelque fois absente, mais quand elle est présente il n’y a qu’une succession de mots-clés non pertinents, comme « Paris » alors que vous êtes à Lyon. La balises alt est utile pour les malvoyants mais aussi un peu pour le référencement car ça permet à Google de connaître le contenu de l’image.</a:t>
+        <p:spPr>
+          <a:xfrm>
+            <a:off x="1194002" y="2234074"/>
+            <a:ext cx="9603275" cy="1049235"/>
+          </a:xfrm>
+        </p:spPr>
+        <p:txBody>
+          <a:bodyPr/>
+          <a:lstStyle/>
+          <a:p>
+            <a:pPr algn="ctr"/>
+            <a:r>
+              <a:rPr lang="fr-FR" u="sng" dirty="0"/>
+              <a:t>Liste des dix améliorations apportées</a:t>
             </a:r>
           </a:p>
         </p:txBody>
@@ -4594,7 +5040,7 @@
     </p:spTree>
     <p:extLst>
       <p:ext uri="{BB962C8B-B14F-4D97-AF65-F5344CB8AC3E}">
-        <p14:creationId xmlns:p14="http://schemas.microsoft.com/office/powerpoint/2010/main" val="1909643335"/>
+        <p14:creationId xmlns:p14="http://schemas.microsoft.com/office/powerpoint/2010/main" val="3024134250"/>
       </p:ext>
     </p:extLst>
   </p:cSld>
@@ -4626,7 +5072,7 @@
           <p:cNvPr id="2" name="Titre 1">
             <a:extLst>
               <a:ext uri="{FF2B5EF4-FFF2-40B4-BE49-F238E27FC236}">
-                <a16:creationId xmlns:a16="http://schemas.microsoft.com/office/drawing/2014/main" id="{8E9E09AD-C49D-44BE-8E24-61A7DA292FCC}"/>
+                <a16:creationId xmlns:a16="http://schemas.microsoft.com/office/drawing/2014/main" id="{2E72794D-ABDE-4528-AC6C-7DCF9A3EDED6}"/>
               </a:ext>
             </a:extLst>
           </p:cNvPr>
@@ -4642,10 +5088,37 @@
           <a:bodyPr/>
           <a:lstStyle/>
           <a:p>
-            <a:pPr algn="ctr"/>
             <a:r>
               <a:rPr lang="fr-FR" dirty="0"/>
-              <a:t>Fin de la présentation</a:t>
+              <a:t>1-lang= « default »</a:t>
+            </a:r>
+          </a:p>
+        </p:txBody>
+      </p:sp>
+      <p:sp>
+        <p:nvSpPr>
+          <p:cNvPr id="3" name="Espace réservé du contenu 2">
+            <a:extLst>
+              <a:ext uri="{FF2B5EF4-FFF2-40B4-BE49-F238E27FC236}">
+                <a16:creationId xmlns:a16="http://schemas.microsoft.com/office/drawing/2014/main" id="{061EEC17-9278-4D67-AA72-BE3EE0E27FDA}"/>
+              </a:ext>
+            </a:extLst>
+          </p:cNvPr>
+          <p:cNvSpPr>
+            <a:spLocks noGrp="1"/>
+          </p:cNvSpPr>
+          <p:nvPr>
+            <p:ph idx="1"/>
+          </p:nvPr>
+        </p:nvSpPr>
+        <p:spPr/>
+        <p:txBody>
+          <a:bodyPr/>
+          <a:lstStyle/>
+          <a:p>
+            <a:r>
+              <a:rPr lang="fr-FR" dirty="0"/>
+              <a:t>Le langage de la page n’est pas déclaré, Google ne détecte donc pas automatiquement la langue de la page</a:t>
             </a:r>
           </a:p>
         </p:txBody>
@@ -4653,7 +5126,7 @@
     </p:spTree>
     <p:extLst>
       <p:ext uri="{BB962C8B-B14F-4D97-AF65-F5344CB8AC3E}">
-        <p14:creationId xmlns:p14="http://schemas.microsoft.com/office/powerpoint/2010/main" val="3914377739"/>
+        <p14:creationId xmlns:p14="http://schemas.microsoft.com/office/powerpoint/2010/main" val="2625562521"/>
       </p:ext>
     </p:extLst>
   </p:cSld>
@@ -4737,6 +5210,21 @@
             <a:r>
               <a:rPr lang="fr-FR" dirty="0"/>
               <a:t>Avant améliorations</a:t>
+            </a:r>
+          </a:p>
+          <a:p>
+            <a:pPr lvl="1"/>
+            <a:r>
+              <a:rPr lang="fr-FR" dirty="0" err="1"/>
+              <a:t>Starting_web_site</a:t>
+            </a:r>
+            <a:endParaRPr lang="fr-FR" dirty="0"/>
+          </a:p>
+          <a:p>
+            <a:pPr lvl="2"/>
+            <a:r>
+              <a:rPr lang="fr-FR" dirty="0"/>
+              <a:t>accueil</a:t>
             </a:r>
           </a:p>
         </p:txBody>
@@ -4790,6 +5278,917 @@
 </p:sld>
 </file>
 
+<file path=ppt/slides/slide20.xml><?xml version="1.0" encoding="utf-8"?>
+<p:sld xmlns:a="http://schemas.openxmlformats.org/drawingml/2006/main" xmlns:r="http://schemas.openxmlformats.org/officeDocument/2006/relationships" xmlns:p="http://schemas.openxmlformats.org/presentationml/2006/main">
+  <p:cSld>
+    <p:spTree>
+      <p:nvGrpSpPr>
+        <p:cNvPr id="1" name=""/>
+        <p:cNvGrpSpPr/>
+        <p:nvPr/>
+      </p:nvGrpSpPr>
+      <p:grpSpPr>
+        <a:xfrm>
+          <a:off x="0" y="0"/>
+          <a:ext cx="0" cy="0"/>
+          <a:chOff x="0" y="0"/>
+          <a:chExt cx="0" cy="0"/>
+        </a:xfrm>
+      </p:grpSpPr>
+      <p:sp>
+        <p:nvSpPr>
+          <p:cNvPr id="2" name="Titre 1">
+            <a:extLst>
+              <a:ext uri="{FF2B5EF4-FFF2-40B4-BE49-F238E27FC236}">
+                <a16:creationId xmlns:a16="http://schemas.microsoft.com/office/drawing/2014/main" id="{5F33EB2F-A620-4283-AF37-8284E33BE126}"/>
+              </a:ext>
+            </a:extLst>
+          </p:cNvPr>
+          <p:cNvSpPr>
+            <a:spLocks noGrp="1"/>
+          </p:cNvSpPr>
+          <p:nvPr>
+            <p:ph type="title"/>
+          </p:nvPr>
+        </p:nvSpPr>
+        <p:spPr/>
+        <p:txBody>
+          <a:bodyPr/>
+          <a:lstStyle/>
+          <a:p>
+            <a:r>
+              <a:rPr lang="fr-FR" dirty="0"/>
+              <a:t>2-balise &lt;</a:t>
+            </a:r>
+            <a:r>
+              <a:rPr lang="fr-FR" dirty="0" err="1"/>
+              <a:t>title</a:t>
+            </a:r>
+            <a:r>
+              <a:rPr lang="fr-FR" dirty="0"/>
+              <a:t>&gt;&lt;/</a:t>
+            </a:r>
+            <a:r>
+              <a:rPr lang="fr-FR" dirty="0" err="1"/>
+              <a:t>title</a:t>
+            </a:r>
+            <a:r>
+              <a:rPr lang="fr-FR" dirty="0"/>
+              <a:t>&gt;</a:t>
+            </a:r>
+          </a:p>
+        </p:txBody>
+      </p:sp>
+      <p:sp>
+        <p:nvSpPr>
+          <p:cNvPr id="3" name="Espace réservé du contenu 2">
+            <a:extLst>
+              <a:ext uri="{FF2B5EF4-FFF2-40B4-BE49-F238E27FC236}">
+                <a16:creationId xmlns:a16="http://schemas.microsoft.com/office/drawing/2014/main" id="{490E0A6D-5595-428E-99FF-84C3E85E0E13}"/>
+              </a:ext>
+            </a:extLst>
+          </p:cNvPr>
+          <p:cNvSpPr>
+            <a:spLocks noGrp="1"/>
+          </p:cNvSpPr>
+          <p:nvPr>
+            <p:ph idx="1"/>
+          </p:nvPr>
+        </p:nvSpPr>
+        <p:spPr/>
+        <p:txBody>
+          <a:bodyPr/>
+          <a:lstStyle/>
+          <a:p>
+            <a:r>
+              <a:rPr lang="fr-FR" dirty="0"/>
+              <a:t>La balise </a:t>
+            </a:r>
+            <a:r>
+              <a:rPr lang="fr-FR" dirty="0" err="1"/>
+              <a:t>title</a:t>
+            </a:r>
+            <a:r>
+              <a:rPr lang="fr-FR" dirty="0"/>
+              <a:t> est l’une des balises les plus importantes pour Google car elle sert à définir le sujet / but principal de la page. Un point n’est pas explicite. Le </a:t>
+            </a:r>
+            <a:r>
+              <a:rPr lang="fr-FR" dirty="0" err="1"/>
+              <a:t>title</a:t>
+            </a:r>
+            <a:r>
+              <a:rPr lang="fr-FR" dirty="0"/>
+              <a:t> sera d’ailleurs aussi affiché sur les résultats de recherches de Google, il faut donc que les utilisateurs aussi comprennent le but de la page pour cliquer.</a:t>
+            </a:r>
+          </a:p>
+        </p:txBody>
+      </p:sp>
+    </p:spTree>
+    <p:extLst>
+      <p:ext uri="{BB962C8B-B14F-4D97-AF65-F5344CB8AC3E}">
+        <p14:creationId xmlns:p14="http://schemas.microsoft.com/office/powerpoint/2010/main" val="1889303693"/>
+      </p:ext>
+    </p:extLst>
+  </p:cSld>
+  <p:clrMapOvr>
+    <a:masterClrMapping/>
+  </p:clrMapOvr>
+</p:sld>
+</file>
+
+<file path=ppt/slides/slide21.xml><?xml version="1.0" encoding="utf-8"?>
+<p:sld xmlns:a="http://schemas.openxmlformats.org/drawingml/2006/main" xmlns:r="http://schemas.openxmlformats.org/officeDocument/2006/relationships" xmlns:p="http://schemas.openxmlformats.org/presentationml/2006/main">
+  <p:cSld>
+    <p:spTree>
+      <p:nvGrpSpPr>
+        <p:cNvPr id="1" name=""/>
+        <p:cNvGrpSpPr/>
+        <p:nvPr/>
+      </p:nvGrpSpPr>
+      <p:grpSpPr>
+        <a:xfrm>
+          <a:off x="0" y="0"/>
+          <a:ext cx="0" cy="0"/>
+          <a:chOff x="0" y="0"/>
+          <a:chExt cx="0" cy="0"/>
+        </a:xfrm>
+      </p:grpSpPr>
+      <p:sp>
+        <p:nvSpPr>
+          <p:cNvPr id="2" name="Titre 1">
+            <a:extLst>
+              <a:ext uri="{FF2B5EF4-FFF2-40B4-BE49-F238E27FC236}">
+                <a16:creationId xmlns:a16="http://schemas.microsoft.com/office/drawing/2014/main" id="{47EA7F8F-07F8-43C0-97E2-E65BFEF9F59F}"/>
+              </a:ext>
+            </a:extLst>
+          </p:cNvPr>
+          <p:cNvSpPr>
+            <a:spLocks noGrp="1"/>
+          </p:cNvSpPr>
+          <p:nvPr>
+            <p:ph type="title"/>
+          </p:nvPr>
+        </p:nvSpPr>
+        <p:spPr/>
+        <p:txBody>
+          <a:bodyPr/>
+          <a:lstStyle/>
+          <a:p>
+            <a:r>
+              <a:rPr lang="fr-FR" dirty="0"/>
+              <a:t>3-Textes sous forme d’image</a:t>
+            </a:r>
+          </a:p>
+        </p:txBody>
+      </p:sp>
+      <p:sp>
+        <p:nvSpPr>
+          <p:cNvPr id="3" name="Espace réservé du contenu 2">
+            <a:extLst>
+              <a:ext uri="{FF2B5EF4-FFF2-40B4-BE49-F238E27FC236}">
+                <a16:creationId xmlns:a16="http://schemas.microsoft.com/office/drawing/2014/main" id="{992E6C39-BF46-4688-9AD8-6F11465FC4E0}"/>
+              </a:ext>
+            </a:extLst>
+          </p:cNvPr>
+          <p:cNvSpPr>
+            <a:spLocks noGrp="1"/>
+          </p:cNvSpPr>
+          <p:nvPr>
+            <p:ph idx="1"/>
+          </p:nvPr>
+        </p:nvSpPr>
+        <p:spPr/>
+        <p:txBody>
+          <a:bodyPr/>
+          <a:lstStyle/>
+          <a:p>
+            <a:r>
+              <a:rPr lang="fr-FR" dirty="0"/>
+              <a:t>Certaines phrases dans la page sont implémentées sous forme d’image. Ca augmente le temps de chargement de la page car les images sont plus lourdes que le texte brut, et ça impacte donc le SEO car le temps de chargement de la page est un critère important pour Google. En plus, les images sont moins pratiques pour adapter le texte sur petits écrans (responsive). De plus, les lecteurs d’écran ne pourront pas lire le texte dans l’image pour les malvoyants. Enfin,  au format texte, on pourra inclure des mots clés pertinents qui ne seront pas reconnus par Google au format image.</a:t>
+            </a:r>
+          </a:p>
+        </p:txBody>
+      </p:sp>
+    </p:spTree>
+    <p:extLst>
+      <p:ext uri="{BB962C8B-B14F-4D97-AF65-F5344CB8AC3E}">
+        <p14:creationId xmlns:p14="http://schemas.microsoft.com/office/powerpoint/2010/main" val="434277876"/>
+      </p:ext>
+    </p:extLst>
+  </p:cSld>
+  <p:clrMapOvr>
+    <a:masterClrMapping/>
+  </p:clrMapOvr>
+</p:sld>
+</file>
+
+<file path=ppt/slides/slide22.xml><?xml version="1.0" encoding="utf-8"?>
+<p:sld xmlns:a="http://schemas.openxmlformats.org/drawingml/2006/main" xmlns:r="http://schemas.openxmlformats.org/officeDocument/2006/relationships" xmlns:p="http://schemas.openxmlformats.org/presentationml/2006/main">
+  <p:cSld>
+    <p:spTree>
+      <p:nvGrpSpPr>
+        <p:cNvPr id="1" name=""/>
+        <p:cNvGrpSpPr/>
+        <p:nvPr/>
+      </p:nvGrpSpPr>
+      <p:grpSpPr>
+        <a:xfrm>
+          <a:off x="0" y="0"/>
+          <a:ext cx="0" cy="0"/>
+          <a:chOff x="0" y="0"/>
+          <a:chExt cx="0" cy="0"/>
+        </a:xfrm>
+      </p:grpSpPr>
+      <p:sp>
+        <p:nvSpPr>
+          <p:cNvPr id="2" name="Titre 1">
+            <a:extLst>
+              <a:ext uri="{FF2B5EF4-FFF2-40B4-BE49-F238E27FC236}">
+                <a16:creationId xmlns:a16="http://schemas.microsoft.com/office/drawing/2014/main" id="{101ABBF6-8598-4596-9587-67E9A0B69AB7}"/>
+              </a:ext>
+            </a:extLst>
+          </p:cNvPr>
+          <p:cNvSpPr>
+            <a:spLocks noGrp="1"/>
+          </p:cNvSpPr>
+          <p:nvPr>
+            <p:ph type="title"/>
+          </p:nvPr>
+        </p:nvSpPr>
+        <p:spPr/>
+        <p:txBody>
+          <a:bodyPr/>
+          <a:lstStyle/>
+          <a:p>
+            <a:r>
+              <a:rPr lang="fr-FR" dirty="0"/>
+              <a:t>4-name="description" content=""</a:t>
+            </a:r>
+          </a:p>
+        </p:txBody>
+      </p:sp>
+      <p:sp>
+        <p:nvSpPr>
+          <p:cNvPr id="3" name="Espace réservé du contenu 2">
+            <a:extLst>
+              <a:ext uri="{FF2B5EF4-FFF2-40B4-BE49-F238E27FC236}">
+                <a16:creationId xmlns:a16="http://schemas.microsoft.com/office/drawing/2014/main" id="{2818D3C8-A90F-4E57-A8FF-9D638B52D22F}"/>
+              </a:ext>
+            </a:extLst>
+          </p:cNvPr>
+          <p:cNvSpPr>
+            <a:spLocks noGrp="1"/>
+          </p:cNvSpPr>
+          <p:nvPr>
+            <p:ph idx="1"/>
+          </p:nvPr>
+        </p:nvSpPr>
+        <p:spPr/>
+        <p:txBody>
+          <a:bodyPr/>
+          <a:lstStyle/>
+          <a:p>
+            <a:r>
+              <a:rPr lang="fr-FR" dirty="0"/>
+              <a:t>La balise description est presque aussi importante que la balise </a:t>
+            </a:r>
+            <a:r>
+              <a:rPr lang="fr-FR" dirty="0" err="1"/>
+              <a:t>title</a:t>
+            </a:r>
+            <a:r>
+              <a:rPr lang="fr-FR" dirty="0"/>
+              <a:t>. Les mots clés à l’intérieur aident Google à savoir de quoi parle la page, et c’est aussi ce qui est affiché sous le </a:t>
+            </a:r>
+            <a:r>
+              <a:rPr lang="fr-FR" dirty="0" err="1"/>
+              <a:t>title</a:t>
+            </a:r>
+            <a:r>
+              <a:rPr lang="fr-FR" dirty="0"/>
+              <a:t> dans les résultats de recherche, c’est donc aussi utile pour vos visiteurs.</a:t>
+            </a:r>
+          </a:p>
+        </p:txBody>
+      </p:sp>
+    </p:spTree>
+    <p:extLst>
+      <p:ext uri="{BB962C8B-B14F-4D97-AF65-F5344CB8AC3E}">
+        <p14:creationId xmlns:p14="http://schemas.microsoft.com/office/powerpoint/2010/main" val="2442860782"/>
+      </p:ext>
+    </p:extLst>
+  </p:cSld>
+  <p:clrMapOvr>
+    <a:masterClrMapping/>
+  </p:clrMapOvr>
+</p:sld>
+</file>
+
+<file path=ppt/slides/slide23.xml><?xml version="1.0" encoding="utf-8"?>
+<p:sld xmlns:a="http://schemas.openxmlformats.org/drawingml/2006/main" xmlns:r="http://schemas.openxmlformats.org/officeDocument/2006/relationships" xmlns:p="http://schemas.openxmlformats.org/presentationml/2006/main">
+  <p:cSld>
+    <p:spTree>
+      <p:nvGrpSpPr>
+        <p:cNvPr id="1" name=""/>
+        <p:cNvGrpSpPr/>
+        <p:nvPr/>
+      </p:nvGrpSpPr>
+      <p:grpSpPr>
+        <a:xfrm>
+          <a:off x="0" y="0"/>
+          <a:ext cx="0" cy="0"/>
+          <a:chOff x="0" y="0"/>
+          <a:chExt cx="0" cy="0"/>
+        </a:xfrm>
+      </p:grpSpPr>
+      <p:sp>
+        <p:nvSpPr>
+          <p:cNvPr id="2" name="Titre 1">
+            <a:extLst>
+              <a:ext uri="{FF2B5EF4-FFF2-40B4-BE49-F238E27FC236}">
+                <a16:creationId xmlns:a16="http://schemas.microsoft.com/office/drawing/2014/main" id="{E071402D-725B-4167-84CF-36D5371B96EC}"/>
+              </a:ext>
+            </a:extLst>
+          </p:cNvPr>
+          <p:cNvSpPr>
+            <a:spLocks noGrp="1"/>
+          </p:cNvSpPr>
+          <p:nvPr>
+            <p:ph type="title"/>
+          </p:nvPr>
+        </p:nvSpPr>
+        <p:spPr/>
+        <p:txBody>
+          <a:bodyPr/>
+          <a:lstStyle/>
+          <a:p>
+            <a:r>
+              <a:rPr lang="fr-FR" dirty="0"/>
+              <a:t>5-Pas de balises sémantiques</a:t>
+            </a:r>
+          </a:p>
+        </p:txBody>
+      </p:sp>
+      <p:sp>
+        <p:nvSpPr>
+          <p:cNvPr id="3" name="Espace réservé du contenu 2">
+            <a:extLst>
+              <a:ext uri="{FF2B5EF4-FFF2-40B4-BE49-F238E27FC236}">
+                <a16:creationId xmlns:a16="http://schemas.microsoft.com/office/drawing/2014/main" id="{77B67AB7-B559-4099-8262-D9424AF43D58}"/>
+              </a:ext>
+            </a:extLst>
+          </p:cNvPr>
+          <p:cNvSpPr>
+            <a:spLocks noGrp="1"/>
+          </p:cNvSpPr>
+          <p:nvPr>
+            <p:ph idx="1"/>
+          </p:nvPr>
+        </p:nvSpPr>
+        <p:spPr/>
+        <p:txBody>
+          <a:bodyPr/>
+          <a:lstStyle/>
+          <a:p>
+            <a:r>
+              <a:rPr lang="fr-FR" dirty="0"/>
+              <a:t>Les balises sémantiques permettent une meilleure accessibilité des contenus pour les personnes nécessitant des logiciels de lecture de site pour consulter le web.</a:t>
+            </a:r>
+          </a:p>
+        </p:txBody>
+      </p:sp>
+    </p:spTree>
+    <p:extLst>
+      <p:ext uri="{BB962C8B-B14F-4D97-AF65-F5344CB8AC3E}">
+        <p14:creationId xmlns:p14="http://schemas.microsoft.com/office/powerpoint/2010/main" val="2554116559"/>
+      </p:ext>
+    </p:extLst>
+  </p:cSld>
+  <p:clrMapOvr>
+    <a:masterClrMapping/>
+  </p:clrMapOvr>
+</p:sld>
+</file>
+
+<file path=ppt/slides/slide24.xml><?xml version="1.0" encoding="utf-8"?>
+<p:sld xmlns:a="http://schemas.openxmlformats.org/drawingml/2006/main" xmlns:r="http://schemas.openxmlformats.org/officeDocument/2006/relationships" xmlns:p="http://schemas.openxmlformats.org/presentationml/2006/main">
+  <p:cSld>
+    <p:spTree>
+      <p:nvGrpSpPr>
+        <p:cNvPr id="1" name=""/>
+        <p:cNvGrpSpPr/>
+        <p:nvPr/>
+      </p:nvGrpSpPr>
+      <p:grpSpPr>
+        <a:xfrm>
+          <a:off x="0" y="0"/>
+          <a:ext cx="0" cy="0"/>
+          <a:chOff x="0" y="0"/>
+          <a:chExt cx="0" cy="0"/>
+        </a:xfrm>
+      </p:grpSpPr>
+      <p:sp>
+        <p:nvSpPr>
+          <p:cNvPr id="2" name="Titre 1">
+            <a:extLst>
+              <a:ext uri="{FF2B5EF4-FFF2-40B4-BE49-F238E27FC236}">
+                <a16:creationId xmlns:a16="http://schemas.microsoft.com/office/drawing/2014/main" id="{F9D44077-2EF9-4EC8-8AC7-5F2BF9EC611F}"/>
+              </a:ext>
+            </a:extLst>
+          </p:cNvPr>
+          <p:cNvSpPr>
+            <a:spLocks noGrp="1"/>
+          </p:cNvSpPr>
+          <p:nvPr>
+            <p:ph type="title"/>
+          </p:nvPr>
+        </p:nvSpPr>
+        <p:spPr/>
+        <p:txBody>
+          <a:bodyPr/>
+          <a:lstStyle/>
+          <a:p>
+            <a:r>
+              <a:rPr lang="fr-FR" dirty="0"/>
+              <a:t>6-Nom des images pas explicite</a:t>
+            </a:r>
+          </a:p>
+        </p:txBody>
+      </p:sp>
+      <p:sp>
+        <p:nvSpPr>
+          <p:cNvPr id="3" name="Espace réservé du contenu 2">
+            <a:extLst>
+              <a:ext uri="{FF2B5EF4-FFF2-40B4-BE49-F238E27FC236}">
+                <a16:creationId xmlns:a16="http://schemas.microsoft.com/office/drawing/2014/main" id="{351189DE-4427-4C60-896A-8E0351FB23DE}"/>
+              </a:ext>
+            </a:extLst>
+          </p:cNvPr>
+          <p:cNvSpPr>
+            <a:spLocks noGrp="1"/>
+          </p:cNvSpPr>
+          <p:nvPr>
+            <p:ph idx="1"/>
+          </p:nvPr>
+        </p:nvSpPr>
+        <p:spPr/>
+        <p:txBody>
+          <a:bodyPr/>
+          <a:lstStyle/>
+          <a:p>
+            <a:r>
+              <a:rPr lang="fr-FR" dirty="0"/>
+              <a:t>Le nom des images n’est pas explicite alors qu’ils jouent un rôle dans le référencement naturel du site car Google saura de quoi il s’agit.</a:t>
+            </a:r>
+          </a:p>
+        </p:txBody>
+      </p:sp>
+    </p:spTree>
+    <p:extLst>
+      <p:ext uri="{BB962C8B-B14F-4D97-AF65-F5344CB8AC3E}">
+        <p14:creationId xmlns:p14="http://schemas.microsoft.com/office/powerpoint/2010/main" val="1584401365"/>
+      </p:ext>
+    </p:extLst>
+  </p:cSld>
+  <p:clrMapOvr>
+    <a:masterClrMapping/>
+  </p:clrMapOvr>
+</p:sld>
+</file>
+
+<file path=ppt/slides/slide25.xml><?xml version="1.0" encoding="utf-8"?>
+<p:sld xmlns:a="http://schemas.openxmlformats.org/drawingml/2006/main" xmlns:r="http://schemas.openxmlformats.org/officeDocument/2006/relationships" xmlns:p="http://schemas.openxmlformats.org/presentationml/2006/main">
+  <p:cSld>
+    <p:spTree>
+      <p:nvGrpSpPr>
+        <p:cNvPr id="1" name=""/>
+        <p:cNvGrpSpPr/>
+        <p:nvPr/>
+      </p:nvGrpSpPr>
+      <p:grpSpPr>
+        <a:xfrm>
+          <a:off x="0" y="0"/>
+          <a:ext cx="0" cy="0"/>
+          <a:chOff x="0" y="0"/>
+          <a:chExt cx="0" cy="0"/>
+        </a:xfrm>
+      </p:grpSpPr>
+      <p:sp>
+        <p:nvSpPr>
+          <p:cNvPr id="2" name="Titre 1">
+            <a:extLst>
+              <a:ext uri="{FF2B5EF4-FFF2-40B4-BE49-F238E27FC236}">
+                <a16:creationId xmlns:a16="http://schemas.microsoft.com/office/drawing/2014/main" id="{5EA6563D-5AAA-4444-AA4B-99CA74C1A647}"/>
+              </a:ext>
+            </a:extLst>
+          </p:cNvPr>
+          <p:cNvSpPr>
+            <a:spLocks noGrp="1"/>
+          </p:cNvSpPr>
+          <p:nvPr>
+            <p:ph type="title"/>
+          </p:nvPr>
+        </p:nvSpPr>
+        <p:spPr/>
+        <p:txBody>
+          <a:bodyPr/>
+          <a:lstStyle/>
+          <a:p>
+            <a:r>
+              <a:rPr lang="fr-FR" dirty="0"/>
+              <a:t>7-&lt;</a:t>
+            </a:r>
+            <a:r>
+              <a:rPr lang="fr-FR" dirty="0" err="1"/>
+              <a:t>meta</a:t>
+            </a:r>
+            <a:r>
+              <a:rPr lang="fr-FR" dirty="0"/>
+              <a:t> </a:t>
+            </a:r>
+            <a:r>
+              <a:rPr lang="fr-FR" dirty="0" err="1"/>
+              <a:t>name</a:t>
+            </a:r>
+            <a:r>
+              <a:rPr lang="fr-FR" dirty="0"/>
+              <a:t>="keywords" content="[...]"&gt;</a:t>
+            </a:r>
+          </a:p>
+        </p:txBody>
+      </p:sp>
+      <p:sp>
+        <p:nvSpPr>
+          <p:cNvPr id="3" name="Espace réservé du contenu 2">
+            <a:extLst>
+              <a:ext uri="{FF2B5EF4-FFF2-40B4-BE49-F238E27FC236}">
+                <a16:creationId xmlns:a16="http://schemas.microsoft.com/office/drawing/2014/main" id="{087799E5-AA99-4EB5-8A44-D8E0C1F5AC27}"/>
+              </a:ext>
+            </a:extLst>
+          </p:cNvPr>
+          <p:cNvSpPr>
+            <a:spLocks noGrp="1"/>
+          </p:cNvSpPr>
+          <p:nvPr>
+            <p:ph idx="1"/>
+          </p:nvPr>
+        </p:nvSpPr>
+        <p:spPr/>
+        <p:txBody>
+          <a:bodyPr/>
+          <a:lstStyle/>
+          <a:p>
+            <a:r>
+              <a:rPr lang="fr-FR" dirty="0"/>
+              <a:t>La balise Keywords est dépréciée aujourd’hui. Au mieux elle n’est pas prise en compte, au pire cela peut-être sanctionné si il y a trop de mots clés dans la balise.</a:t>
+            </a:r>
+          </a:p>
+        </p:txBody>
+      </p:sp>
+    </p:spTree>
+    <p:extLst>
+      <p:ext uri="{BB962C8B-B14F-4D97-AF65-F5344CB8AC3E}">
+        <p14:creationId xmlns:p14="http://schemas.microsoft.com/office/powerpoint/2010/main" val="3584817504"/>
+      </p:ext>
+    </p:extLst>
+  </p:cSld>
+  <p:clrMapOvr>
+    <a:masterClrMapping/>
+  </p:clrMapOvr>
+</p:sld>
+</file>
+
+<file path=ppt/slides/slide26.xml><?xml version="1.0" encoding="utf-8"?>
+<p:sld xmlns:a="http://schemas.openxmlformats.org/drawingml/2006/main" xmlns:r="http://schemas.openxmlformats.org/officeDocument/2006/relationships" xmlns:p="http://schemas.openxmlformats.org/presentationml/2006/main">
+  <p:cSld>
+    <p:spTree>
+      <p:nvGrpSpPr>
+        <p:cNvPr id="1" name=""/>
+        <p:cNvGrpSpPr/>
+        <p:nvPr/>
+      </p:nvGrpSpPr>
+      <p:grpSpPr>
+        <a:xfrm>
+          <a:off x="0" y="0"/>
+          <a:ext cx="0" cy="0"/>
+          <a:chOff x="0" y="0"/>
+          <a:chExt cx="0" cy="0"/>
+        </a:xfrm>
+      </p:grpSpPr>
+      <p:sp>
+        <p:nvSpPr>
+          <p:cNvPr id="2" name="Titre 1">
+            <a:extLst>
+              <a:ext uri="{FF2B5EF4-FFF2-40B4-BE49-F238E27FC236}">
+                <a16:creationId xmlns:a16="http://schemas.microsoft.com/office/drawing/2014/main" id="{8BD9F299-88A2-464C-B7BE-0D78EBBAC5A1}"/>
+              </a:ext>
+            </a:extLst>
+          </p:cNvPr>
+          <p:cNvSpPr>
+            <a:spLocks noGrp="1"/>
+          </p:cNvSpPr>
+          <p:nvPr>
+            <p:ph type="title"/>
+          </p:nvPr>
+        </p:nvSpPr>
+        <p:spPr/>
+        <p:txBody>
+          <a:bodyPr/>
+          <a:lstStyle/>
+          <a:p>
+            <a:r>
+              <a:rPr lang="fr-FR" dirty="0"/>
+              <a:t>8-Le nom de la page de contact</a:t>
+            </a:r>
+          </a:p>
+        </p:txBody>
+      </p:sp>
+      <p:sp>
+        <p:nvSpPr>
+          <p:cNvPr id="3" name="Espace réservé du contenu 2">
+            <a:extLst>
+              <a:ext uri="{FF2B5EF4-FFF2-40B4-BE49-F238E27FC236}">
+                <a16:creationId xmlns:a16="http://schemas.microsoft.com/office/drawing/2014/main" id="{ED69E767-A1CB-4D6C-A315-C8D7249555CE}"/>
+              </a:ext>
+            </a:extLst>
+          </p:cNvPr>
+          <p:cNvSpPr>
+            <a:spLocks noGrp="1"/>
+          </p:cNvSpPr>
+          <p:nvPr>
+            <p:ph idx="1"/>
+          </p:nvPr>
+        </p:nvSpPr>
+        <p:spPr/>
+        <p:txBody>
+          <a:bodyPr/>
+          <a:lstStyle/>
+          <a:p>
+            <a:r>
+              <a:rPr lang="fr-FR" dirty="0"/>
+              <a:t>Le nom de la page de contact est « page2 ». Ce n’est pas explicite ni pour Google ni pour les visiteurs.</a:t>
+            </a:r>
+          </a:p>
+          <a:p>
+            <a:r>
+              <a:rPr lang="fr-FR" dirty="0"/>
+              <a:t>Elle a été remplacée par:  « contact »</a:t>
+            </a:r>
+          </a:p>
+        </p:txBody>
+      </p:sp>
+    </p:spTree>
+    <p:extLst>
+      <p:ext uri="{BB962C8B-B14F-4D97-AF65-F5344CB8AC3E}">
+        <p14:creationId xmlns:p14="http://schemas.microsoft.com/office/powerpoint/2010/main" val="1949017567"/>
+      </p:ext>
+    </p:extLst>
+  </p:cSld>
+  <p:clrMapOvr>
+    <a:masterClrMapping/>
+  </p:clrMapOvr>
+</p:sld>
+</file>
+
+<file path=ppt/slides/slide27.xml><?xml version="1.0" encoding="utf-8"?>
+<p:sld xmlns:a="http://schemas.openxmlformats.org/drawingml/2006/main" xmlns:r="http://schemas.openxmlformats.org/officeDocument/2006/relationships" xmlns:p="http://schemas.openxmlformats.org/presentationml/2006/main">
+  <p:cSld>
+    <p:spTree>
+      <p:nvGrpSpPr>
+        <p:cNvPr id="1" name=""/>
+        <p:cNvGrpSpPr/>
+        <p:nvPr/>
+      </p:nvGrpSpPr>
+      <p:grpSpPr>
+        <a:xfrm>
+          <a:off x="0" y="0"/>
+          <a:ext cx="0" cy="0"/>
+          <a:chOff x="0" y="0"/>
+          <a:chExt cx="0" cy="0"/>
+        </a:xfrm>
+      </p:grpSpPr>
+      <p:sp>
+        <p:nvSpPr>
+          <p:cNvPr id="2" name="Titre 1">
+            <a:extLst>
+              <a:ext uri="{FF2B5EF4-FFF2-40B4-BE49-F238E27FC236}">
+                <a16:creationId xmlns:a16="http://schemas.microsoft.com/office/drawing/2014/main" id="{F01415BB-62D8-4B37-AEFE-96476F58EE1F}"/>
+              </a:ext>
+            </a:extLst>
+          </p:cNvPr>
+          <p:cNvSpPr>
+            <a:spLocks noGrp="1"/>
+          </p:cNvSpPr>
+          <p:nvPr>
+            <p:ph type="title"/>
+          </p:nvPr>
+        </p:nvSpPr>
+        <p:spPr/>
+        <p:txBody>
+          <a:bodyPr/>
+          <a:lstStyle/>
+          <a:p>
+            <a:r>
+              <a:rPr lang="fr-FR" dirty="0"/>
+              <a:t>9-Technique </a:t>
+            </a:r>
+            <a:r>
+              <a:rPr lang="fr-FR" dirty="0" err="1"/>
+              <a:t>blackhat</a:t>
+            </a:r>
+            <a:r>
+              <a:rPr lang="fr-FR" dirty="0"/>
+              <a:t> : mots clés en petit sur fond blanc</a:t>
+            </a:r>
+          </a:p>
+        </p:txBody>
+      </p:sp>
+      <p:sp>
+        <p:nvSpPr>
+          <p:cNvPr id="3" name="Espace réservé du contenu 2">
+            <a:extLst>
+              <a:ext uri="{FF2B5EF4-FFF2-40B4-BE49-F238E27FC236}">
+                <a16:creationId xmlns:a16="http://schemas.microsoft.com/office/drawing/2014/main" id="{FF95F175-EDEE-4D94-9FD8-CC1C1D10F19F}"/>
+              </a:ext>
+            </a:extLst>
+          </p:cNvPr>
+          <p:cNvSpPr>
+            <a:spLocks noGrp="1"/>
+          </p:cNvSpPr>
+          <p:nvPr>
+            <p:ph idx="1"/>
+          </p:nvPr>
+        </p:nvSpPr>
+        <p:spPr/>
+        <p:txBody>
+          <a:bodyPr/>
+          <a:lstStyle/>
+          <a:p>
+            <a:r>
+              <a:rPr lang="fr-FR" dirty="0"/>
+              <a:t>La div avec la classe « keywords » contient une succession de mots clés sans contexte, il s’agit d’une technique malicieuse pour booster artificiellement son référencement mais Google peut détecter les plus grossières dont celle-ci. En plus de rien rapporter, Google attribuera un malus à votre page qu’il sera difficile à faire enlever.</a:t>
+            </a:r>
+          </a:p>
+        </p:txBody>
+      </p:sp>
+    </p:spTree>
+    <p:extLst>
+      <p:ext uri="{BB962C8B-B14F-4D97-AF65-F5344CB8AC3E}">
+        <p14:creationId xmlns:p14="http://schemas.microsoft.com/office/powerpoint/2010/main" val="1032213200"/>
+      </p:ext>
+    </p:extLst>
+  </p:cSld>
+  <p:clrMapOvr>
+    <a:masterClrMapping/>
+  </p:clrMapOvr>
+</p:sld>
+</file>
+
+<file path=ppt/slides/slide28.xml><?xml version="1.0" encoding="utf-8"?>
+<p:sld xmlns:a="http://schemas.openxmlformats.org/drawingml/2006/main" xmlns:r="http://schemas.openxmlformats.org/officeDocument/2006/relationships" xmlns:p="http://schemas.openxmlformats.org/presentationml/2006/main">
+  <p:cSld>
+    <p:spTree>
+      <p:nvGrpSpPr>
+        <p:cNvPr id="1" name=""/>
+        <p:cNvGrpSpPr/>
+        <p:nvPr/>
+      </p:nvGrpSpPr>
+      <p:grpSpPr>
+        <a:xfrm>
+          <a:off x="0" y="0"/>
+          <a:ext cx="0" cy="0"/>
+          <a:chOff x="0" y="0"/>
+          <a:chExt cx="0" cy="0"/>
+        </a:xfrm>
+      </p:grpSpPr>
+      <p:sp>
+        <p:nvSpPr>
+          <p:cNvPr id="2" name="Titre 1">
+            <a:extLst>
+              <a:ext uri="{FF2B5EF4-FFF2-40B4-BE49-F238E27FC236}">
+                <a16:creationId xmlns:a16="http://schemas.microsoft.com/office/drawing/2014/main" id="{DC00E362-A1C5-47B9-826D-135F2E9F6ADF}"/>
+              </a:ext>
+            </a:extLst>
+          </p:cNvPr>
+          <p:cNvSpPr>
+            <a:spLocks noGrp="1"/>
+          </p:cNvSpPr>
+          <p:nvPr>
+            <p:ph type="title"/>
+          </p:nvPr>
+        </p:nvSpPr>
+        <p:spPr/>
+        <p:txBody>
+          <a:bodyPr/>
+          <a:lstStyle/>
+          <a:p>
+            <a:r>
+              <a:rPr lang="fr-FR" dirty="0"/>
+              <a:t>10-Les balises alt sont parfois absentes ou alors mal complétées</a:t>
+            </a:r>
+          </a:p>
+        </p:txBody>
+      </p:sp>
+      <p:sp>
+        <p:nvSpPr>
+          <p:cNvPr id="3" name="Espace réservé du contenu 2">
+            <a:extLst>
+              <a:ext uri="{FF2B5EF4-FFF2-40B4-BE49-F238E27FC236}">
+                <a16:creationId xmlns:a16="http://schemas.microsoft.com/office/drawing/2014/main" id="{8E0C9BBE-66F0-4918-A3BE-B34F679FD4A4}"/>
+              </a:ext>
+            </a:extLst>
+          </p:cNvPr>
+          <p:cNvSpPr>
+            <a:spLocks noGrp="1"/>
+          </p:cNvSpPr>
+          <p:nvPr>
+            <p:ph idx="1"/>
+          </p:nvPr>
+        </p:nvSpPr>
+        <p:spPr/>
+        <p:txBody>
+          <a:bodyPr/>
+          <a:lstStyle/>
+          <a:p>
+            <a:r>
+              <a:rPr lang="fr-FR" dirty="0"/>
+              <a:t>La balises Alt est quelque fois absente, mais quand elle est présente il n’y a qu’une succession de mots-clés non pertinents, comme « Paris » alors que vous êtes à Lyon. La balises alt est utile pour les malvoyants mais aussi un peu pour le référencement car ça permet à Google de connaître le contenu de l’image.</a:t>
+            </a:r>
+          </a:p>
+        </p:txBody>
+      </p:sp>
+    </p:spTree>
+    <p:extLst>
+      <p:ext uri="{BB962C8B-B14F-4D97-AF65-F5344CB8AC3E}">
+        <p14:creationId xmlns:p14="http://schemas.microsoft.com/office/powerpoint/2010/main" val="1909643335"/>
+      </p:ext>
+    </p:extLst>
+  </p:cSld>
+  <p:clrMapOvr>
+    <a:masterClrMapping/>
+  </p:clrMapOvr>
+</p:sld>
+</file>
+
+<file path=ppt/slides/slide29.xml><?xml version="1.0" encoding="utf-8"?>
+<p:sld xmlns:a="http://schemas.openxmlformats.org/drawingml/2006/main" xmlns:r="http://schemas.openxmlformats.org/officeDocument/2006/relationships" xmlns:p="http://schemas.openxmlformats.org/presentationml/2006/main">
+  <p:cSld>
+    <p:spTree>
+      <p:nvGrpSpPr>
+        <p:cNvPr id="1" name=""/>
+        <p:cNvGrpSpPr/>
+        <p:nvPr/>
+      </p:nvGrpSpPr>
+      <p:grpSpPr>
+        <a:xfrm>
+          <a:off x="0" y="0"/>
+          <a:ext cx="0" cy="0"/>
+          <a:chOff x="0" y="0"/>
+          <a:chExt cx="0" cy="0"/>
+        </a:xfrm>
+      </p:grpSpPr>
+      <p:sp>
+        <p:nvSpPr>
+          <p:cNvPr id="2" name="Titre 1">
+            <a:extLst>
+              <a:ext uri="{FF2B5EF4-FFF2-40B4-BE49-F238E27FC236}">
+                <a16:creationId xmlns:a16="http://schemas.microsoft.com/office/drawing/2014/main" id="{8E9E09AD-C49D-44BE-8E24-61A7DA292FCC}"/>
+              </a:ext>
+            </a:extLst>
+          </p:cNvPr>
+          <p:cNvSpPr>
+            <a:spLocks noGrp="1"/>
+          </p:cNvSpPr>
+          <p:nvPr>
+            <p:ph type="title"/>
+          </p:nvPr>
+        </p:nvSpPr>
+        <p:spPr/>
+        <p:txBody>
+          <a:bodyPr/>
+          <a:lstStyle/>
+          <a:p>
+            <a:pPr algn="ctr"/>
+            <a:r>
+              <a:rPr lang="fr-FR" dirty="0"/>
+              <a:t>Fin de la présentation</a:t>
+            </a:r>
+          </a:p>
+        </p:txBody>
+      </p:sp>
+    </p:spTree>
+    <p:extLst>
+      <p:ext uri="{BB962C8B-B14F-4D97-AF65-F5344CB8AC3E}">
+        <p14:creationId xmlns:p14="http://schemas.microsoft.com/office/powerpoint/2010/main" val="3914377739"/>
+      </p:ext>
+    </p:extLst>
+  </p:cSld>
+  <p:clrMapOvr>
+    <a:masterClrMapping/>
+  </p:clrMapOvr>
+</p:sld>
+</file>
+
 <file path=ppt/slides/slide3.xml><?xml version="1.0" encoding="utf-8"?>
 <p:sld xmlns:a="http://schemas.openxmlformats.org/drawingml/2006/main" xmlns:r="http://schemas.openxmlformats.org/officeDocument/2006/relationships" xmlns:p="http://schemas.openxmlformats.org/presentationml/2006/main">
   <p:cSld>
@@ -4861,19 +6260,39 @@
           <a:bodyPr/>
           <a:lstStyle/>
           <a:p>
+            <a:pPr lvl="1"/>
             <a:r>
               <a:rPr lang="fr-FR" dirty="0"/>
               <a:t>Après amélioration</a:t>
             </a:r>
           </a:p>
+          <a:p>
+            <a:pPr lvl="2"/>
+            <a:r>
+              <a:rPr lang="fr-FR" dirty="0"/>
+              <a:t>Version_modifiée</a:t>
+            </a:r>
+          </a:p>
+          <a:p>
+            <a:pPr lvl="3"/>
+            <a:r>
+              <a:rPr lang="fr-FR" dirty="0" err="1"/>
+              <a:t>Page_accueil</a:t>
+            </a:r>
+            <a:endParaRPr lang="fr-FR" dirty="0"/>
+          </a:p>
+          <a:p>
+            <a:pPr lvl="2"/>
+            <a:endParaRPr lang="fr-FR" dirty="0"/>
+          </a:p>
         </p:txBody>
       </p:sp>
       <p:pic>
         <p:nvPicPr>
-          <p:cNvPr id="7" name="Image 6">
+          <p:cNvPr id="5" name="Image 4">
             <a:extLst>
               <a:ext uri="{FF2B5EF4-FFF2-40B4-BE49-F238E27FC236}">
-                <a16:creationId xmlns:a16="http://schemas.microsoft.com/office/drawing/2014/main" id="{EE691159-FFEA-4F08-BFC9-87E2E4271EF0}"/>
+                <a16:creationId xmlns:a16="http://schemas.microsoft.com/office/drawing/2014/main" id="{C918839C-C80A-44BC-B4D7-B9ABBB014563}"/>
               </a:ext>
             </a:extLst>
           </p:cNvPr>
@@ -4896,8 +6315,8 @@
         </p:blipFill>
         <p:spPr>
           <a:xfrm>
-            <a:off x="4525775" y="1853754"/>
-            <a:ext cx="5953334" cy="4562545"/>
+            <a:off x="4537031" y="1853754"/>
+            <a:ext cx="5871004" cy="4842268"/>
           </a:xfrm>
           <a:prstGeom prst="rect">
             <a:avLst/>
@@ -4939,7 +6358,7 @@
           <p:cNvPr id="2" name="Titre 1">
             <a:extLst>
               <a:ext uri="{FF2B5EF4-FFF2-40B4-BE49-F238E27FC236}">
-                <a16:creationId xmlns:a16="http://schemas.microsoft.com/office/drawing/2014/main" id="{B3E740AE-23E4-4595-A25D-10A297ADD273}"/>
+                <a16:creationId xmlns:a16="http://schemas.microsoft.com/office/drawing/2014/main" id="{2E95CCBF-8866-4117-AF33-2FCED0275905}"/>
               </a:ext>
             </a:extLst>
           </p:cNvPr>
@@ -4961,27 +6380,71 @@
             </a:r>
             <a:r>
               <a:rPr lang="fr-FR" dirty="0" err="1"/>
-              <a:t>wave</a:t>
-            </a:r>
+              <a:t>lighthouse</a:t>
+            </a:r>
+            <a:endParaRPr lang="fr-FR" dirty="0"/>
+          </a:p>
+        </p:txBody>
+      </p:sp>
+      <p:sp>
+        <p:nvSpPr>
+          <p:cNvPr id="3" name="Espace réservé du contenu 2">
+            <a:extLst>
+              <a:ext uri="{FF2B5EF4-FFF2-40B4-BE49-F238E27FC236}">
+                <a16:creationId xmlns:a16="http://schemas.microsoft.com/office/drawing/2014/main" id="{9C4A8B8C-B568-4C79-A0F0-6AACCFF30F73}"/>
+              </a:ext>
+            </a:extLst>
+          </p:cNvPr>
+          <p:cNvSpPr>
+            <a:spLocks noGrp="1"/>
+          </p:cNvSpPr>
+          <p:nvPr>
+            <p:ph idx="1"/>
+          </p:nvPr>
+        </p:nvSpPr>
+        <p:spPr/>
+        <p:txBody>
+          <a:bodyPr/>
+          <a:lstStyle/>
+          <a:p>
+            <a:r>
+              <a:rPr lang="fr-FR" dirty="0"/>
+              <a:t>Avant améliorations</a:t>
+            </a:r>
+          </a:p>
+          <a:p>
+            <a:pPr lvl="1"/>
+            <a:r>
+              <a:rPr lang="fr-FR" dirty="0" err="1"/>
+              <a:t>Starting_web_site</a:t>
+            </a:r>
+            <a:endParaRPr lang="fr-FR" dirty="0"/>
+          </a:p>
+          <a:p>
+            <a:pPr lvl="2"/>
+            <a:r>
+              <a:rPr lang="fr-FR" dirty="0"/>
+              <a:t>Page_2</a:t>
+            </a:r>
+          </a:p>
+          <a:p>
             <a:endParaRPr lang="fr-FR" dirty="0"/>
           </a:p>
         </p:txBody>
       </p:sp>
       <p:pic>
         <p:nvPicPr>
-          <p:cNvPr id="5" name="Espace réservé du contenu 4">
+          <p:cNvPr id="5" name="Image 4">
             <a:extLst>
               <a:ext uri="{FF2B5EF4-FFF2-40B4-BE49-F238E27FC236}">
-                <a16:creationId xmlns:a16="http://schemas.microsoft.com/office/drawing/2014/main" id="{B30E8BC4-81A8-44F0-95D9-182D3662A8E4}"/>
+                <a16:creationId xmlns:a16="http://schemas.microsoft.com/office/drawing/2014/main" id="{B06C0C9D-7D86-4E44-A850-CED6B920B3ED}"/>
               </a:ext>
             </a:extLst>
           </p:cNvPr>
           <p:cNvPicPr>
-            <a:picLocks noGrp="1" noChangeAspect="1"/>
+            <a:picLocks noChangeAspect="1"/>
           </p:cNvPicPr>
-          <p:nvPr>
-            <p:ph idx="1"/>
-          </p:nvPr>
+          <p:nvPr/>
         </p:nvPicPr>
         <p:blipFill>
           <a:blip r:embed="rId2">
@@ -4997,50 +6460,18 @@
         </p:blipFill>
         <p:spPr>
           <a:xfrm>
-            <a:off x="4951938" y="1874346"/>
-            <a:ext cx="2288123" cy="4179135"/>
-          </a:xfrm>
-        </p:spPr>
-      </p:pic>
-      <p:sp>
-        <p:nvSpPr>
-          <p:cNvPr id="6" name="ZoneTexte 5">
-            <a:extLst>
-              <a:ext uri="{FF2B5EF4-FFF2-40B4-BE49-F238E27FC236}">
-                <a16:creationId xmlns:a16="http://schemas.microsoft.com/office/drawing/2014/main" id="{8C67A6EF-710B-498B-BE0A-E7670DB48D8B}"/>
-              </a:ext>
-            </a:extLst>
-          </p:cNvPr>
-          <p:cNvSpPr txBox="1"/>
-          <p:nvPr/>
-        </p:nvSpPr>
-        <p:spPr>
-          <a:xfrm>
-            <a:off x="1451579" y="2159000"/>
-            <a:ext cx="2635183" cy="369332"/>
+            <a:off x="4384112" y="1853754"/>
+            <a:ext cx="4874629" cy="4485539"/>
           </a:xfrm>
           <a:prstGeom prst="rect">
             <a:avLst/>
           </a:prstGeom>
-          <a:noFill/>
         </p:spPr>
-        <p:txBody>
-          <a:bodyPr wrap="square" rtlCol="0">
-            <a:spAutoFit/>
-          </a:bodyPr>
-          <a:lstStyle/>
-          <a:p>
-            <a:r>
-              <a:rPr lang="fr-FR" dirty="0"/>
-              <a:t>Avant:</a:t>
-            </a:r>
-          </a:p>
-        </p:txBody>
-      </p:sp>
+      </p:pic>
     </p:spTree>
     <p:extLst>
       <p:ext uri="{BB962C8B-B14F-4D97-AF65-F5344CB8AC3E}">
-        <p14:creationId xmlns:p14="http://schemas.microsoft.com/office/powerpoint/2010/main" val="2995031672"/>
+        <p14:creationId xmlns:p14="http://schemas.microsoft.com/office/powerpoint/2010/main" val="366786264"/>
       </p:ext>
     </p:extLst>
   </p:cSld>
@@ -5072,7 +6503,7 @@
           <p:cNvPr id="2" name="Titre 1">
             <a:extLst>
               <a:ext uri="{FF2B5EF4-FFF2-40B4-BE49-F238E27FC236}">
-                <a16:creationId xmlns:a16="http://schemas.microsoft.com/office/drawing/2014/main" id="{62F41970-888F-4B8E-8A4F-9B1D6AA228A9}"/>
+                <a16:creationId xmlns:a16="http://schemas.microsoft.com/office/drawing/2014/main" id="{BE99D212-D7F2-4D62-B575-E82F6465D12E}"/>
               </a:ext>
             </a:extLst>
           </p:cNvPr>
@@ -5094,7 +6525,7 @@
             </a:r>
             <a:r>
               <a:rPr lang="fr-FR" dirty="0" err="1"/>
-              <a:t>wave</a:t>
+              <a:t>lighthouse</a:t>
             </a:r>
             <a:endParaRPr lang="fr-FR" dirty="0"/>
           </a:p>
@@ -5105,7 +6536,7 @@
           <p:cNvPr id="3" name="Espace réservé du contenu 2">
             <a:extLst>
               <a:ext uri="{FF2B5EF4-FFF2-40B4-BE49-F238E27FC236}">
-                <a16:creationId xmlns:a16="http://schemas.microsoft.com/office/drawing/2014/main" id="{86320096-369F-4FCB-83F1-55CBCE7C83EC}"/>
+                <a16:creationId xmlns:a16="http://schemas.microsoft.com/office/drawing/2014/main" id="{4E70FEB9-60A2-43C1-9B8C-6C1A9328CBD9}"/>
               </a:ext>
             </a:extLst>
           </p:cNvPr>
@@ -5123,8 +6554,27 @@
           <a:p>
             <a:r>
               <a:rPr lang="fr-FR" dirty="0"/>
-              <a:t>Après:</a:t>
-            </a:r>
+              <a:t>Après amélioration</a:t>
+            </a:r>
+          </a:p>
+          <a:p>
+            <a:pPr lvl="1"/>
+            <a:r>
+              <a:rPr lang="fr-FR" dirty="0"/>
+              <a:t>Version_modifiée</a:t>
+            </a:r>
+          </a:p>
+          <a:p>
+            <a:pPr lvl="2"/>
+            <a:r>
+              <a:rPr lang="fr-FR" dirty="0" err="1"/>
+              <a:t>Page_contact</a:t>
+            </a:r>
+            <a:endParaRPr lang="fr-FR" dirty="0"/>
+          </a:p>
+          <a:p>
+            <a:pPr lvl="1"/>
+            <a:endParaRPr lang="fr-FR" dirty="0"/>
           </a:p>
         </p:txBody>
       </p:sp>
@@ -5133,7 +6583,7 @@
           <p:cNvPr id="5" name="Image 4">
             <a:extLst>
               <a:ext uri="{FF2B5EF4-FFF2-40B4-BE49-F238E27FC236}">
-                <a16:creationId xmlns:a16="http://schemas.microsoft.com/office/drawing/2014/main" id="{3D2D3766-7245-4CE1-933B-00D284C2D190}"/>
+                <a16:creationId xmlns:a16="http://schemas.microsoft.com/office/drawing/2014/main" id="{7CA50045-0640-4E22-8070-F67BD98F4FBA}"/>
               </a:ext>
             </a:extLst>
           </p:cNvPr>
@@ -5156,8 +6606,8 @@
         </p:blipFill>
         <p:spPr>
           <a:xfrm>
-            <a:off x="4919134" y="1867229"/>
-            <a:ext cx="2272598" cy="4159593"/>
+            <a:off x="4430332" y="1853754"/>
+            <a:ext cx="5694310" cy="4800700"/>
           </a:xfrm>
           <a:prstGeom prst="rect">
             <a:avLst/>
@@ -5167,7 +6617,7 @@
     </p:spTree>
     <p:extLst>
       <p:ext uri="{BB962C8B-B14F-4D97-AF65-F5344CB8AC3E}">
-        <p14:creationId xmlns:p14="http://schemas.microsoft.com/office/powerpoint/2010/main" val="3568261620"/>
+        <p14:creationId xmlns:p14="http://schemas.microsoft.com/office/powerpoint/2010/main" val="578235782"/>
       </p:ext>
     </p:extLst>
   </p:cSld>
@@ -5199,7 +6649,7 @@
           <p:cNvPr id="2" name="Titre 1">
             <a:extLst>
               <a:ext uri="{FF2B5EF4-FFF2-40B4-BE49-F238E27FC236}">
-                <a16:creationId xmlns:a16="http://schemas.microsoft.com/office/drawing/2014/main" id="{172B957F-C9F4-4A44-BE15-D3A1486F3BBD}"/>
+                <a16:creationId xmlns:a16="http://schemas.microsoft.com/office/drawing/2014/main" id="{C86DC681-6F72-40FF-A9BC-DF70059B0A90}"/>
               </a:ext>
             </a:extLst>
           </p:cNvPr>
@@ -5221,7 +6671,7 @@
             </a:r>
             <a:r>
               <a:rPr lang="fr-FR" dirty="0" err="1"/>
-              <a:t>gtmetrics</a:t>
+              <a:t>uptrends</a:t>
             </a:r>
             <a:endParaRPr lang="fr-FR" dirty="0"/>
           </a:p>
@@ -5232,7 +6682,7 @@
           <p:cNvPr id="3" name="Espace réservé du contenu 2">
             <a:extLst>
               <a:ext uri="{FF2B5EF4-FFF2-40B4-BE49-F238E27FC236}">
-                <a16:creationId xmlns:a16="http://schemas.microsoft.com/office/drawing/2014/main" id="{8010474E-FE79-4DAF-BE3F-A686A567DE01}"/>
+                <a16:creationId xmlns:a16="http://schemas.microsoft.com/office/drawing/2014/main" id="{AE751C30-1633-4F4A-9B95-3ACE3F5F2417}"/>
               </a:ext>
             </a:extLst>
           </p:cNvPr>
@@ -5250,8 +6700,34 @@
           <a:p>
             <a:r>
               <a:rPr lang="fr-FR" dirty="0"/>
-              <a:t>Avant</a:t>
-            </a:r>
+              <a:t>Avant améliorations</a:t>
+            </a:r>
+          </a:p>
+          <a:p>
+            <a:pPr lvl="1"/>
+            <a:r>
+              <a:rPr lang="fr-FR" dirty="0" err="1"/>
+              <a:t>Starter_web_site</a:t>
+            </a:r>
+            <a:endParaRPr lang="fr-FR" dirty="0"/>
+          </a:p>
+          <a:p>
+            <a:pPr lvl="2"/>
+            <a:r>
+              <a:rPr lang="fr-FR" dirty="0" err="1"/>
+              <a:t>Version_desktop</a:t>
+            </a:r>
+            <a:endParaRPr lang="fr-FR" dirty="0"/>
+          </a:p>
+          <a:p>
+            <a:pPr lvl="3"/>
+            <a:r>
+              <a:rPr lang="fr-FR" dirty="0"/>
+              <a:t>accueil</a:t>
+            </a:r>
+          </a:p>
+          <a:p>
+            <a:endParaRPr lang="fr-FR" dirty="0"/>
           </a:p>
         </p:txBody>
       </p:sp>
@@ -5260,7 +6736,7 @@
           <p:cNvPr id="5" name="Image 4">
             <a:extLst>
               <a:ext uri="{FF2B5EF4-FFF2-40B4-BE49-F238E27FC236}">
-                <a16:creationId xmlns:a16="http://schemas.microsoft.com/office/drawing/2014/main" id="{9DECE85C-B84F-49CC-BC3B-473D17637CE4}"/>
+                <a16:creationId xmlns:a16="http://schemas.microsoft.com/office/drawing/2014/main" id="{300EFF83-965E-4043-A3C9-F52DA0CBF6C6}"/>
               </a:ext>
             </a:extLst>
           </p:cNvPr>
@@ -5283,8 +6759,8 @@
         </p:blipFill>
         <p:spPr>
           <a:xfrm>
-            <a:off x="3072478" y="1964012"/>
-            <a:ext cx="8229275" cy="4809404"/>
+            <a:off x="4434582" y="2015731"/>
+            <a:ext cx="5482149" cy="4663335"/>
           </a:xfrm>
           <a:prstGeom prst="rect">
             <a:avLst/>
@@ -5294,7 +6770,7 @@
     </p:spTree>
     <p:extLst>
       <p:ext uri="{BB962C8B-B14F-4D97-AF65-F5344CB8AC3E}">
-        <p14:creationId xmlns:p14="http://schemas.microsoft.com/office/powerpoint/2010/main" val="1327386694"/>
+        <p14:creationId xmlns:p14="http://schemas.microsoft.com/office/powerpoint/2010/main" val="4280838770"/>
       </p:ext>
     </p:extLst>
   </p:cSld>
@@ -5326,7 +6802,7 @@
           <p:cNvPr id="2" name="Titre 1">
             <a:extLst>
               <a:ext uri="{FF2B5EF4-FFF2-40B4-BE49-F238E27FC236}">
-                <a16:creationId xmlns:a16="http://schemas.microsoft.com/office/drawing/2014/main" id="{4DE86361-BB27-4288-A789-CE316FB513A9}"/>
+                <a16:creationId xmlns:a16="http://schemas.microsoft.com/office/drawing/2014/main" id="{0A376953-0DEA-4111-A9F5-A2BD6207442F}"/>
               </a:ext>
             </a:extLst>
           </p:cNvPr>
@@ -5348,7 +6824,7 @@
             </a:r>
             <a:r>
               <a:rPr lang="fr-FR" dirty="0" err="1"/>
-              <a:t>gtmetrics</a:t>
+              <a:t>uptrends</a:t>
             </a:r>
             <a:endParaRPr lang="fr-FR" dirty="0"/>
           </a:p>
@@ -5359,7 +6835,7 @@
           <p:cNvPr id="3" name="Espace réservé du contenu 2">
             <a:extLst>
               <a:ext uri="{FF2B5EF4-FFF2-40B4-BE49-F238E27FC236}">
-                <a16:creationId xmlns:a16="http://schemas.microsoft.com/office/drawing/2014/main" id="{9A315E66-D012-430B-B7F8-D1979D063CBB}"/>
+                <a16:creationId xmlns:a16="http://schemas.microsoft.com/office/drawing/2014/main" id="{B0A3C75A-2E5F-4D75-8EA5-28D65874B413}"/>
               </a:ext>
             </a:extLst>
           </p:cNvPr>
@@ -5376,18 +6852,43 @@
           <a:lstStyle/>
           <a:p>
             <a:r>
-              <a:rPr lang="fr-FR" dirty="0"/>
-              <a:t>Après</a:t>
-            </a:r>
+              <a:rPr lang="fr-FR" dirty="0" err="1"/>
+              <a:t>Après_amélioration</a:t>
+            </a:r>
+            <a:endParaRPr lang="fr-FR" dirty="0"/>
+          </a:p>
+          <a:p>
+            <a:pPr lvl="1"/>
+            <a:r>
+              <a:rPr lang="fr-FR" dirty="0" err="1"/>
+              <a:t>La_chouette_agence</a:t>
+            </a:r>
+            <a:endParaRPr lang="fr-FR" dirty="0"/>
+          </a:p>
+          <a:p>
+            <a:pPr lvl="2"/>
+            <a:r>
+              <a:rPr lang="fr-FR" dirty="0" err="1"/>
+              <a:t>Version_desktop</a:t>
+            </a:r>
+            <a:endParaRPr lang="fr-FR" dirty="0"/>
+          </a:p>
+          <a:p>
+            <a:pPr lvl="3"/>
+            <a:r>
+              <a:rPr lang="fr-FR" dirty="0" err="1"/>
+              <a:t>Page_accueil</a:t>
+            </a:r>
+            <a:endParaRPr lang="fr-FR" dirty="0"/>
           </a:p>
         </p:txBody>
       </p:sp>
       <p:pic>
         <p:nvPicPr>
-          <p:cNvPr id="5" name="Image 4">
+          <p:cNvPr id="7" name="Image 6">
             <a:extLst>
               <a:ext uri="{FF2B5EF4-FFF2-40B4-BE49-F238E27FC236}">
-                <a16:creationId xmlns:a16="http://schemas.microsoft.com/office/drawing/2014/main" id="{29A1B41A-079A-4241-B3A2-118AB8411267}"/>
+                <a16:creationId xmlns:a16="http://schemas.microsoft.com/office/drawing/2014/main" id="{B5E62228-E476-49FD-8598-2726D6F7AE3A}"/>
               </a:ext>
             </a:extLst>
           </p:cNvPr>
@@ -5410,8 +6911,8 @@
         </p:blipFill>
         <p:spPr>
           <a:xfrm>
-            <a:off x="3219717" y="2015732"/>
-            <a:ext cx="8003883" cy="4740100"/>
+            <a:off x="4213068" y="1853754"/>
+            <a:ext cx="7240544" cy="4315488"/>
           </a:xfrm>
           <a:prstGeom prst="rect">
             <a:avLst/>
@@ -5421,7 +6922,7 @@
     </p:spTree>
     <p:extLst>
       <p:ext uri="{BB962C8B-B14F-4D97-AF65-F5344CB8AC3E}">
-        <p14:creationId xmlns:p14="http://schemas.microsoft.com/office/powerpoint/2010/main" val="137286599"/>
+        <p14:creationId xmlns:p14="http://schemas.microsoft.com/office/powerpoint/2010/main" val="1209354081"/>
       </p:ext>
     </p:extLst>
   </p:cSld>
@@ -5453,7 +6954,7 @@
           <p:cNvPr id="2" name="Titre 1">
             <a:extLst>
               <a:ext uri="{FF2B5EF4-FFF2-40B4-BE49-F238E27FC236}">
-                <a16:creationId xmlns:a16="http://schemas.microsoft.com/office/drawing/2014/main" id="{CA27DFF1-3C88-4403-A7EA-BF8C05B82E3E}"/>
+                <a16:creationId xmlns:a16="http://schemas.microsoft.com/office/drawing/2014/main" id="{D0B6600D-F9DD-408B-A643-D1ED4B968A2B}"/>
               </a:ext>
             </a:extLst>
           </p:cNvPr>
@@ -5469,18 +6970,117 @@
           <a:bodyPr/>
           <a:lstStyle/>
           <a:p>
-            <a:pPr algn="ctr"/>
             <a:r>
               <a:rPr lang="fr-FR" dirty="0"/>
-              <a:t>Liste des dix améliorations apportées</a:t>
-            </a:r>
-          </a:p>
-        </p:txBody>
-      </p:sp>
+              <a:t>Mesure de performance sur </a:t>
+            </a:r>
+            <a:r>
+              <a:rPr lang="fr-FR" dirty="0" err="1"/>
+              <a:t>uptrends</a:t>
+            </a:r>
+            <a:endParaRPr lang="fr-FR" dirty="0"/>
+          </a:p>
+        </p:txBody>
+      </p:sp>
+      <p:sp>
+        <p:nvSpPr>
+          <p:cNvPr id="3" name="Espace réservé du contenu 2">
+            <a:extLst>
+              <a:ext uri="{FF2B5EF4-FFF2-40B4-BE49-F238E27FC236}">
+                <a16:creationId xmlns:a16="http://schemas.microsoft.com/office/drawing/2014/main" id="{7DC792C7-DFAC-4283-9D37-A5E26AAA6C7C}"/>
+              </a:ext>
+            </a:extLst>
+          </p:cNvPr>
+          <p:cNvSpPr>
+            <a:spLocks noGrp="1"/>
+          </p:cNvSpPr>
+          <p:nvPr>
+            <p:ph idx="1"/>
+          </p:nvPr>
+        </p:nvSpPr>
+        <p:spPr/>
+        <p:txBody>
+          <a:bodyPr/>
+          <a:lstStyle/>
+          <a:p>
+            <a:r>
+              <a:rPr lang="fr-FR" dirty="0"/>
+              <a:t>Avant améliorations</a:t>
+            </a:r>
+          </a:p>
+          <a:p>
+            <a:pPr lvl="1"/>
+            <a:r>
+              <a:rPr lang="fr-FR" dirty="0" err="1"/>
+              <a:t>Starter_web_site</a:t>
+            </a:r>
+            <a:endParaRPr lang="fr-FR" dirty="0"/>
+          </a:p>
+          <a:p>
+            <a:pPr lvl="2"/>
+            <a:r>
+              <a:rPr lang="fr-FR" dirty="0" err="1"/>
+              <a:t>Version_desktop</a:t>
+            </a:r>
+            <a:endParaRPr lang="fr-FR" dirty="0"/>
+          </a:p>
+          <a:p>
+            <a:pPr lvl="3"/>
+            <a:r>
+              <a:rPr lang="fr-FR" dirty="0"/>
+              <a:t>Page_2</a:t>
+            </a:r>
+          </a:p>
+          <a:p>
+            <a:pPr lvl="2"/>
+            <a:endParaRPr lang="fr-FR" dirty="0"/>
+          </a:p>
+          <a:p>
+            <a:pPr lvl="1"/>
+            <a:endParaRPr lang="fr-FR" dirty="0"/>
+          </a:p>
+        </p:txBody>
+      </p:sp>
+      <p:pic>
+        <p:nvPicPr>
+          <p:cNvPr id="5" name="Image 4">
+            <a:extLst>
+              <a:ext uri="{FF2B5EF4-FFF2-40B4-BE49-F238E27FC236}">
+                <a16:creationId xmlns:a16="http://schemas.microsoft.com/office/drawing/2014/main" id="{B817786B-DB19-4D42-B2F3-16380E7B02DD}"/>
+              </a:ext>
+            </a:extLst>
+          </p:cNvPr>
+          <p:cNvPicPr>
+            <a:picLocks noChangeAspect="1"/>
+          </p:cNvPicPr>
+          <p:nvPr/>
+        </p:nvPicPr>
+        <p:blipFill>
+          <a:blip r:embed="rId2">
+            <a:extLst>
+              <a:ext uri="{28A0092B-C50C-407E-A947-70E740481C1C}">
+                <a14:useLocalDpi xmlns:a14="http://schemas.microsoft.com/office/drawing/2010/main" val="0"/>
+              </a:ext>
+            </a:extLst>
+          </a:blip>
+          <a:stretch>
+            <a:fillRect/>
+          </a:stretch>
+        </p:blipFill>
+        <p:spPr>
+          <a:xfrm>
+            <a:off x="4713667" y="1931287"/>
+            <a:ext cx="6097434" cy="4482391"/>
+          </a:xfrm>
+          <a:prstGeom prst="rect">
+            <a:avLst/>
+          </a:prstGeom>
+        </p:spPr>
+      </p:pic>
     </p:spTree>
     <p:extLst>
       <p:ext uri="{BB962C8B-B14F-4D97-AF65-F5344CB8AC3E}">
-        <p14:creationId xmlns:p14="http://schemas.microsoft.com/office/powerpoint/2010/main" val="3024134250"/>
+        <p14:creationId xmlns:p14="http://schemas.microsoft.com/office/powerpoint/2010/main" val="2051065737"/>
       </p:ext>
     </p:extLst>
   </p:cSld>
@@ -5512,7 +7112,7 @@
           <p:cNvPr id="2" name="Titre 1">
             <a:extLst>
               <a:ext uri="{FF2B5EF4-FFF2-40B4-BE49-F238E27FC236}">
-                <a16:creationId xmlns:a16="http://schemas.microsoft.com/office/drawing/2014/main" id="{2E72794D-ABDE-4528-AC6C-7DCF9A3EDED6}"/>
+                <a16:creationId xmlns:a16="http://schemas.microsoft.com/office/drawing/2014/main" id="{A5D23205-7BB7-41B6-A170-4F171D49AF0E}"/>
               </a:ext>
             </a:extLst>
           </p:cNvPr>
@@ -5530,8 +7130,13 @@
           <a:p>
             <a:r>
               <a:rPr lang="fr-FR" dirty="0"/>
-              <a:t>1-lang= « default »</a:t>
-            </a:r>
+              <a:t>Mesure de performance sur </a:t>
+            </a:r>
+            <a:r>
+              <a:rPr lang="fr-FR" dirty="0" err="1"/>
+              <a:t>uptrends</a:t>
+            </a:r>
+            <a:endParaRPr lang="fr-FR" dirty="0"/>
           </a:p>
         </p:txBody>
       </p:sp>
@@ -5540,7 +7145,7 @@
           <p:cNvPr id="3" name="Espace réservé du contenu 2">
             <a:extLst>
               <a:ext uri="{FF2B5EF4-FFF2-40B4-BE49-F238E27FC236}">
-                <a16:creationId xmlns:a16="http://schemas.microsoft.com/office/drawing/2014/main" id="{061EEC17-9278-4D67-AA72-BE3EE0E27FDA}"/>
+                <a16:creationId xmlns:a16="http://schemas.microsoft.com/office/drawing/2014/main" id="{0C13AC41-01BD-463B-BDA7-3796BB0FEA52}"/>
               </a:ext>
             </a:extLst>
           </p:cNvPr>
@@ -5557,16 +7162,85 @@
           <a:lstStyle/>
           <a:p>
             <a:r>
-              <a:rPr lang="fr-FR" dirty="0"/>
-              <a:t>Le langage de la page n’est pas déclaré, Google ne détecte donc pas automatiquement la langue de la page</a:t>
-            </a:r>
-          </a:p>
-        </p:txBody>
-      </p:sp>
+              <a:rPr lang="fr-FR" dirty="0" err="1"/>
+              <a:t>Après_amélioration</a:t>
+            </a:r>
+            <a:endParaRPr lang="fr-FR" dirty="0"/>
+          </a:p>
+          <a:p>
+            <a:pPr lvl="1"/>
+            <a:r>
+              <a:rPr lang="fr-FR" dirty="0" err="1"/>
+              <a:t>La_chouette_agence</a:t>
+            </a:r>
+            <a:endParaRPr lang="fr-FR" dirty="0"/>
+          </a:p>
+          <a:p>
+            <a:pPr lvl="2"/>
+            <a:r>
+              <a:rPr lang="fr-FR" dirty="0" err="1"/>
+              <a:t>Version_desktop</a:t>
+            </a:r>
+            <a:endParaRPr lang="fr-FR" dirty="0"/>
+          </a:p>
+          <a:p>
+            <a:pPr lvl="3"/>
+            <a:r>
+              <a:rPr lang="fr-FR" dirty="0" err="1"/>
+              <a:t>Page_contact</a:t>
+            </a:r>
+            <a:endParaRPr lang="fr-FR" dirty="0"/>
+          </a:p>
+          <a:p>
+            <a:pPr lvl="2"/>
+            <a:endParaRPr lang="fr-FR" dirty="0"/>
+          </a:p>
+          <a:p>
+            <a:pPr lvl="1"/>
+            <a:endParaRPr lang="fr-FR" dirty="0"/>
+          </a:p>
+        </p:txBody>
+      </p:sp>
+      <p:pic>
+        <p:nvPicPr>
+          <p:cNvPr id="5" name="Image 4">
+            <a:extLst>
+              <a:ext uri="{FF2B5EF4-FFF2-40B4-BE49-F238E27FC236}">
+                <a16:creationId xmlns:a16="http://schemas.microsoft.com/office/drawing/2014/main" id="{3BDB9CC1-C272-46DE-9431-284310F98676}"/>
+              </a:ext>
+            </a:extLst>
+          </p:cNvPr>
+          <p:cNvPicPr>
+            <a:picLocks noChangeAspect="1"/>
+          </p:cNvPicPr>
+          <p:nvPr/>
+        </p:nvPicPr>
+        <p:blipFill>
+          <a:blip r:embed="rId2">
+            <a:extLst>
+              <a:ext uri="{28A0092B-C50C-407E-A947-70E740481C1C}">
+                <a14:useLocalDpi xmlns:a14="http://schemas.microsoft.com/office/drawing/2010/main" val="0"/>
+              </a:ext>
+            </a:extLst>
+          </a:blip>
+          <a:stretch>
+            <a:fillRect/>
+          </a:stretch>
+        </p:blipFill>
+        <p:spPr>
+          <a:xfrm>
+            <a:off x="4328096" y="2015732"/>
+            <a:ext cx="7700772" cy="4140369"/>
+          </a:xfrm>
+          <a:prstGeom prst="rect">
+            <a:avLst/>
+          </a:prstGeom>
+        </p:spPr>
+      </p:pic>
     </p:spTree>
     <p:extLst>
       <p:ext uri="{BB962C8B-B14F-4D97-AF65-F5344CB8AC3E}">
-        <p14:creationId xmlns:p14="http://schemas.microsoft.com/office/powerpoint/2010/main" val="2625562521"/>
+        <p14:creationId xmlns:p14="http://schemas.microsoft.com/office/powerpoint/2010/main" val="3297836897"/>
       </p:ext>
     </p:extLst>
   </p:cSld>

</xml_diff>